<commit_message>
Updated the Notebook for Classification, updated the README, and updated the powerpoint.
</commit_message>
<xml_diff>
--- a/Machine Learning for Beginners.pptx
+++ b/Machine Learning for Beginners.pptx
@@ -7,15 +7,18 @@
   <p:sldIdLst>
     <p:sldId id="256" r:id="rId2"/>
     <p:sldId id="257" r:id="rId3"/>
-    <p:sldId id="259" r:id="rId4"/>
-    <p:sldId id="258" r:id="rId5"/>
-    <p:sldId id="260" r:id="rId6"/>
-    <p:sldId id="266" r:id="rId7"/>
-    <p:sldId id="261" r:id="rId8"/>
-    <p:sldId id="262" r:id="rId9"/>
-    <p:sldId id="263" r:id="rId10"/>
-    <p:sldId id="264" r:id="rId11"/>
-    <p:sldId id="265" r:id="rId12"/>
+    <p:sldId id="267" r:id="rId4"/>
+    <p:sldId id="268" r:id="rId5"/>
+    <p:sldId id="258" r:id="rId6"/>
+    <p:sldId id="259" r:id="rId7"/>
+    <p:sldId id="260" r:id="rId8"/>
+    <p:sldId id="266" r:id="rId9"/>
+    <p:sldId id="261" r:id="rId10"/>
+    <p:sldId id="262" r:id="rId11"/>
+    <p:sldId id="263" r:id="rId12"/>
+    <p:sldId id="269" r:id="rId13"/>
+    <p:sldId id="264" r:id="rId14"/>
+    <p:sldId id="265" r:id="rId15"/>
   </p:sldIdLst>
   <p:sldSz cx="12192000" cy="6858000"/>
   <p:notesSz cx="6858000" cy="9144000"/>
@@ -114,6 +117,11 @@
       </a:defRPr>
     </a:lvl9pPr>
   </p:defaultTextStyle>
+  <p:extLst>
+    <p:ext uri="{EFAFB233-063F-42B5-8137-9DF3F51BA10A}">
+      <p15:sldGuideLst xmlns:p15="http://schemas.microsoft.com/office/powerpoint/2012/main"/>
+    </p:ext>
+  </p:extLst>
 </p:presentation>
 </file>
 
@@ -167,7 +175,7 @@
           <a:noFill/>
           <a:extLst>
             <a:ext uri="{909E8E84-426E-40dd-AFC4-6F175D3DCCD1}">
-              <a14:hiddenFill xmlns:a14="http://schemas.microsoft.com/office/drawing/2010/main" xmlns="">
+              <a14:hiddenFill xmlns="" xmlns:a14="http://schemas.microsoft.com/office/drawing/2010/main">
                 <a:solidFill>
                   <a:srgbClr val="FFFFFF"/>
                 </a:solidFill>
@@ -227,7 +235,7 @@
             </a:ln>
             <a:extLst>
               <a:ext uri="{91240B29-F687-4f45-9708-019B960494DF}">
-                <a14:hiddenLine xmlns:a14="http://schemas.microsoft.com/office/drawing/2010/main" xmlns="" w="9525">
+                <a14:hiddenLine xmlns="" xmlns:a14="http://schemas.microsoft.com/office/drawing/2010/main" w="9525">
                   <a:solidFill>
                     <a:srgbClr val="000000"/>
                   </a:solidFill>
@@ -317,7 +325,7 @@
             </a:ln>
             <a:extLst>
               <a:ext uri="{91240B29-F687-4f45-9708-019B960494DF}">
-                <a14:hiddenLine xmlns:a14="http://schemas.microsoft.com/office/drawing/2010/main" xmlns="" w="9525">
+                <a14:hiddenLine xmlns="" xmlns:a14="http://schemas.microsoft.com/office/drawing/2010/main" w="9525">
                   <a:solidFill>
                     <a:srgbClr val="000000"/>
                   </a:solidFill>
@@ -407,7 +415,7 @@
             </a:ln>
             <a:extLst>
               <a:ext uri="{91240B29-F687-4f45-9708-019B960494DF}">
-                <a14:hiddenLine xmlns:a14="http://schemas.microsoft.com/office/drawing/2010/main" xmlns="" w="9525">
+                <a14:hiddenLine xmlns="" xmlns:a14="http://schemas.microsoft.com/office/drawing/2010/main" w="9525">
                   <a:solidFill>
                     <a:srgbClr val="000000"/>
                   </a:solidFill>
@@ -441,7 +449,7 @@
             </a:ln>
             <a:extLst>
               <a:ext uri="{91240B29-F687-4f45-9708-019B960494DF}">
-                <a14:hiddenLine xmlns:a14="http://schemas.microsoft.com/office/drawing/2010/main" xmlns="" w="9525">
+                <a14:hiddenLine xmlns="" xmlns:a14="http://schemas.microsoft.com/office/drawing/2010/main" w="9525">
                   <a:solidFill>
                     <a:srgbClr val="000000"/>
                   </a:solidFill>
@@ -531,7 +539,7 @@
             </a:ln>
             <a:extLst>
               <a:ext uri="{91240B29-F687-4f45-9708-019B960494DF}">
-                <a14:hiddenLine xmlns:a14="http://schemas.microsoft.com/office/drawing/2010/main" xmlns="" w="9525">
+                <a14:hiddenLine xmlns="" xmlns:a14="http://schemas.microsoft.com/office/drawing/2010/main" w="9525">
                   <a:solidFill>
                     <a:srgbClr val="000000"/>
                   </a:solidFill>
@@ -593,7 +601,7 @@
             </a:ln>
             <a:extLst>
               <a:ext uri="{91240B29-F687-4f45-9708-019B960494DF}">
-                <a14:hiddenLine xmlns:a14="http://schemas.microsoft.com/office/drawing/2010/main" xmlns="" w="9525">
+                <a14:hiddenLine xmlns="" xmlns:a14="http://schemas.microsoft.com/office/drawing/2010/main" w="9525">
                   <a:solidFill>
                     <a:srgbClr val="000000"/>
                   </a:solidFill>
@@ -655,7 +663,7 @@
             </a:ln>
             <a:extLst>
               <a:ext uri="{91240B29-F687-4f45-9708-019B960494DF}">
-                <a14:hiddenLine xmlns:a14="http://schemas.microsoft.com/office/drawing/2010/main" xmlns="" w="9525">
+                <a14:hiddenLine xmlns="" xmlns:a14="http://schemas.microsoft.com/office/drawing/2010/main" w="9525">
                   <a:solidFill>
                     <a:srgbClr val="000000"/>
                   </a:solidFill>
@@ -745,7 +753,7 @@
             </a:ln>
             <a:extLst>
               <a:ext uri="{91240B29-F687-4f45-9708-019B960494DF}">
-                <a14:hiddenLine xmlns:a14="http://schemas.microsoft.com/office/drawing/2010/main" xmlns="" w="9525">
+                <a14:hiddenLine xmlns="" xmlns:a14="http://schemas.microsoft.com/office/drawing/2010/main" w="9525">
                   <a:solidFill>
                     <a:srgbClr val="000000"/>
                   </a:solidFill>
@@ -807,7 +815,7 @@
             </a:ln>
             <a:extLst>
               <a:ext uri="{91240B29-F687-4f45-9708-019B960494DF}">
-                <a14:hiddenLine xmlns:a14="http://schemas.microsoft.com/office/drawing/2010/main" xmlns="" w="9525">
+                <a14:hiddenLine xmlns="" xmlns:a14="http://schemas.microsoft.com/office/drawing/2010/main" w="9525">
                   <a:solidFill>
                     <a:srgbClr val="000000"/>
                   </a:solidFill>
@@ -869,7 +877,7 @@
             </a:ln>
             <a:extLst>
               <a:ext uri="{91240B29-F687-4f45-9708-019B960494DF}">
-                <a14:hiddenLine xmlns:a14="http://schemas.microsoft.com/office/drawing/2010/main" xmlns="" w="9525">
+                <a14:hiddenLine xmlns="" xmlns:a14="http://schemas.microsoft.com/office/drawing/2010/main" w="9525">
                   <a:solidFill>
                     <a:srgbClr val="000000"/>
                   </a:solidFill>
@@ -959,7 +967,7 @@
             </a:ln>
             <a:extLst>
               <a:ext uri="{91240B29-F687-4f45-9708-019B960494DF}">
-                <a14:hiddenLine xmlns:a14="http://schemas.microsoft.com/office/drawing/2010/main" xmlns="" w="9525">
+                <a14:hiddenLine xmlns="" xmlns:a14="http://schemas.microsoft.com/office/drawing/2010/main" w="9525">
                   <a:solidFill>
                     <a:srgbClr val="000000"/>
                   </a:solidFill>
@@ -1049,7 +1057,7 @@
             </a:ln>
             <a:extLst>
               <a:ext uri="{91240B29-F687-4f45-9708-019B960494DF}">
-                <a14:hiddenLine xmlns:a14="http://schemas.microsoft.com/office/drawing/2010/main" xmlns="" w="9525">
+                <a14:hiddenLine xmlns="" xmlns:a14="http://schemas.microsoft.com/office/drawing/2010/main" w="9525">
                   <a:solidFill>
                     <a:srgbClr val="000000"/>
                   </a:solidFill>
@@ -1111,7 +1119,7 @@
             </a:ln>
             <a:extLst>
               <a:ext uri="{91240B29-F687-4f45-9708-019B960494DF}">
-                <a14:hiddenLine xmlns:a14="http://schemas.microsoft.com/office/drawing/2010/main" xmlns="" w="9525">
+                <a14:hiddenLine xmlns="" xmlns:a14="http://schemas.microsoft.com/office/drawing/2010/main" w="9525">
                   <a:solidFill>
                     <a:srgbClr val="000000"/>
                   </a:solidFill>
@@ -1221,7 +1229,7 @@
             </a:ln>
             <a:extLst>
               <a:ext uri="{91240B29-F687-4f45-9708-019B960494DF}">
-                <a14:hiddenLine xmlns:a14="http://schemas.microsoft.com/office/drawing/2010/main" xmlns="" w="9525">
+                <a14:hiddenLine xmlns="" xmlns:a14="http://schemas.microsoft.com/office/drawing/2010/main" w="9525">
                   <a:solidFill>
                     <a:srgbClr val="000000"/>
                   </a:solidFill>
@@ -1283,7 +1291,7 @@
             </a:ln>
             <a:extLst>
               <a:ext uri="{91240B29-F687-4f45-9708-019B960494DF}">
-                <a14:hiddenLine xmlns:a14="http://schemas.microsoft.com/office/drawing/2010/main" xmlns="" w="9525">
+                <a14:hiddenLine xmlns="" xmlns:a14="http://schemas.microsoft.com/office/drawing/2010/main" w="9525">
                   <a:solidFill>
                     <a:srgbClr val="000000"/>
                   </a:solidFill>
@@ -1373,7 +1381,7 @@
             </a:ln>
             <a:extLst>
               <a:ext uri="{91240B29-F687-4f45-9708-019B960494DF}">
-                <a14:hiddenLine xmlns:a14="http://schemas.microsoft.com/office/drawing/2010/main" xmlns="" w="9525">
+                <a14:hiddenLine xmlns="" xmlns:a14="http://schemas.microsoft.com/office/drawing/2010/main" w="9525">
                   <a:solidFill>
                     <a:srgbClr val="000000"/>
                   </a:solidFill>
@@ -1463,7 +1471,7 @@
             </a:ln>
             <a:extLst>
               <a:ext uri="{91240B29-F687-4f45-9708-019B960494DF}">
-                <a14:hiddenLine xmlns:a14="http://schemas.microsoft.com/office/drawing/2010/main" xmlns="" w="9525">
+                <a14:hiddenLine xmlns="" xmlns:a14="http://schemas.microsoft.com/office/drawing/2010/main" w="9525">
                   <a:solidFill>
                     <a:srgbClr val="000000"/>
                   </a:solidFill>
@@ -1525,7 +1533,7 @@
             </a:ln>
             <a:extLst>
               <a:ext uri="{91240B29-F687-4f45-9708-019B960494DF}">
-                <a14:hiddenLine xmlns:a14="http://schemas.microsoft.com/office/drawing/2010/main" xmlns="" w="9525">
+                <a14:hiddenLine xmlns="" xmlns:a14="http://schemas.microsoft.com/office/drawing/2010/main" w="9525">
                   <a:solidFill>
                     <a:srgbClr val="000000"/>
                   </a:solidFill>
@@ -1615,7 +1623,7 @@
             </a:ln>
             <a:extLst>
               <a:ext uri="{91240B29-F687-4f45-9708-019B960494DF}">
-                <a14:hiddenLine xmlns:a14="http://schemas.microsoft.com/office/drawing/2010/main" xmlns="" w="9525">
+                <a14:hiddenLine xmlns="" xmlns:a14="http://schemas.microsoft.com/office/drawing/2010/main" w="9525">
                   <a:solidFill>
                     <a:srgbClr val="000000"/>
                   </a:solidFill>
@@ -1705,7 +1713,7 @@
             </a:ln>
             <a:extLst>
               <a:ext uri="{91240B29-F687-4f45-9708-019B960494DF}">
-                <a14:hiddenLine xmlns:a14="http://schemas.microsoft.com/office/drawing/2010/main" xmlns="" w="9525">
+                <a14:hiddenLine xmlns="" xmlns:a14="http://schemas.microsoft.com/office/drawing/2010/main" w="9525">
                   <a:solidFill>
                     <a:srgbClr val="000000"/>
                   </a:solidFill>
@@ -1761,7 +1769,7 @@
             </a:ln>
             <a:extLst>
               <a:ext uri="{91240B29-F687-4f45-9708-019B960494DF}">
-                <a14:hiddenLine xmlns:a14="http://schemas.microsoft.com/office/drawing/2010/main" xmlns="" w="9525">
+                <a14:hiddenLine xmlns="" xmlns:a14="http://schemas.microsoft.com/office/drawing/2010/main" w="9525">
                   <a:solidFill>
                     <a:srgbClr val="000000"/>
                   </a:solidFill>
@@ -1851,7 +1859,7 @@
             </a:ln>
             <a:extLst>
               <a:ext uri="{91240B29-F687-4f45-9708-019B960494DF}">
-                <a14:hiddenLine xmlns:a14="http://schemas.microsoft.com/office/drawing/2010/main" xmlns="" w="9525">
+                <a14:hiddenLine xmlns="" xmlns:a14="http://schemas.microsoft.com/office/drawing/2010/main" w="9525">
                   <a:solidFill>
                     <a:srgbClr val="000000"/>
                   </a:solidFill>
@@ -1907,7 +1915,7 @@
             </a:ln>
             <a:extLst>
               <a:ext uri="{91240B29-F687-4f45-9708-019B960494DF}">
-                <a14:hiddenLine xmlns:a14="http://schemas.microsoft.com/office/drawing/2010/main" xmlns="" w="9525">
+                <a14:hiddenLine xmlns="" xmlns:a14="http://schemas.microsoft.com/office/drawing/2010/main" w="9525">
                   <a:solidFill>
                     <a:srgbClr val="000000"/>
                   </a:solidFill>
@@ -1997,7 +2005,7 @@
             </a:ln>
             <a:extLst>
               <a:ext uri="{91240B29-F687-4f45-9708-019B960494DF}">
-                <a14:hiddenLine xmlns:a14="http://schemas.microsoft.com/office/drawing/2010/main" xmlns="" w="9525">
+                <a14:hiddenLine xmlns="" xmlns:a14="http://schemas.microsoft.com/office/drawing/2010/main" w="9525">
                   <a:solidFill>
                     <a:srgbClr val="000000"/>
                   </a:solidFill>
@@ -2065,7 +2073,7 @@
             </a:ln>
             <a:extLst>
               <a:ext uri="{91240B29-F687-4f45-9708-019B960494DF}">
-                <a14:hiddenLine xmlns:a14="http://schemas.microsoft.com/office/drawing/2010/main" xmlns="" w="9525">
+                <a14:hiddenLine xmlns="" xmlns:a14="http://schemas.microsoft.com/office/drawing/2010/main" w="9525">
                   <a:solidFill>
                     <a:srgbClr val="000000"/>
                   </a:solidFill>
@@ -2155,7 +2163,7 @@
             </a:ln>
             <a:extLst>
               <a:ext uri="{91240B29-F687-4f45-9708-019B960494DF}">
-                <a14:hiddenLine xmlns:a14="http://schemas.microsoft.com/office/drawing/2010/main" xmlns="" w="9525">
+                <a14:hiddenLine xmlns="" xmlns:a14="http://schemas.microsoft.com/office/drawing/2010/main" w="9525">
                   <a:solidFill>
                     <a:srgbClr val="000000"/>
                   </a:solidFill>
@@ -2223,7 +2231,7 @@
             </a:ln>
             <a:extLst>
               <a:ext uri="{91240B29-F687-4f45-9708-019B960494DF}">
-                <a14:hiddenLine xmlns:a14="http://schemas.microsoft.com/office/drawing/2010/main" xmlns="" w="9525">
+                <a14:hiddenLine xmlns="" xmlns:a14="http://schemas.microsoft.com/office/drawing/2010/main" w="9525">
                   <a:solidFill>
                     <a:srgbClr val="000000"/>
                   </a:solidFill>
@@ -2313,7 +2321,7 @@
             </a:ln>
             <a:extLst>
               <a:ext uri="{91240B29-F687-4f45-9708-019B960494DF}">
-                <a14:hiddenLine xmlns:a14="http://schemas.microsoft.com/office/drawing/2010/main" xmlns="" w="9525">
+                <a14:hiddenLine xmlns="" xmlns:a14="http://schemas.microsoft.com/office/drawing/2010/main" w="9525">
                   <a:solidFill>
                     <a:srgbClr val="000000"/>
                   </a:solidFill>
@@ -2347,7 +2355,7 @@
             </a:ln>
             <a:extLst>
               <a:ext uri="{91240B29-F687-4f45-9708-019B960494DF}">
-                <a14:hiddenLine xmlns:a14="http://schemas.microsoft.com/office/drawing/2010/main" xmlns="" w="9525">
+                <a14:hiddenLine xmlns="" xmlns:a14="http://schemas.microsoft.com/office/drawing/2010/main" w="9525">
                   <a:solidFill>
                     <a:srgbClr val="000000"/>
                   </a:solidFill>
@@ -2437,7 +2445,7 @@
             </a:ln>
             <a:extLst>
               <a:ext uri="{91240B29-F687-4f45-9708-019B960494DF}">
-                <a14:hiddenLine xmlns:a14="http://schemas.microsoft.com/office/drawing/2010/main" xmlns="" w="9525">
+                <a14:hiddenLine xmlns="" xmlns:a14="http://schemas.microsoft.com/office/drawing/2010/main" w="9525">
                   <a:solidFill>
                     <a:srgbClr val="000000"/>
                   </a:solidFill>
@@ -2499,7 +2507,7 @@
             </a:ln>
             <a:extLst>
               <a:ext uri="{91240B29-F687-4f45-9708-019B960494DF}">
-                <a14:hiddenLine xmlns:a14="http://schemas.microsoft.com/office/drawing/2010/main" xmlns="" w="9525">
+                <a14:hiddenLine xmlns="" xmlns:a14="http://schemas.microsoft.com/office/drawing/2010/main" w="9525">
                   <a:solidFill>
                     <a:srgbClr val="000000"/>
                   </a:solidFill>
@@ -2561,7 +2569,7 @@
             </a:ln>
             <a:extLst>
               <a:ext uri="{91240B29-F687-4f45-9708-019B960494DF}">
-                <a14:hiddenLine xmlns:a14="http://schemas.microsoft.com/office/drawing/2010/main" xmlns="" w="9525">
+                <a14:hiddenLine xmlns="" xmlns:a14="http://schemas.microsoft.com/office/drawing/2010/main" w="9525">
                   <a:solidFill>
                     <a:srgbClr val="000000"/>
                   </a:solidFill>
@@ -2651,7 +2659,7 @@
             </a:ln>
             <a:extLst>
               <a:ext uri="{91240B29-F687-4f45-9708-019B960494DF}">
-                <a14:hiddenLine xmlns:a14="http://schemas.microsoft.com/office/drawing/2010/main" xmlns="" w="9525">
+                <a14:hiddenLine xmlns="" xmlns:a14="http://schemas.microsoft.com/office/drawing/2010/main" w="9525">
                   <a:solidFill>
                     <a:srgbClr val="000000"/>
                   </a:solidFill>
@@ -2719,7 +2727,7 @@
             </a:ln>
             <a:extLst>
               <a:ext uri="{91240B29-F687-4f45-9708-019B960494DF}">
-                <a14:hiddenLine xmlns:a14="http://schemas.microsoft.com/office/drawing/2010/main" xmlns="" w="9525">
+                <a14:hiddenLine xmlns="" xmlns:a14="http://schemas.microsoft.com/office/drawing/2010/main" w="9525">
                   <a:solidFill>
                     <a:srgbClr val="000000"/>
                   </a:solidFill>
@@ -2781,7 +2789,7 @@
             </a:ln>
             <a:extLst>
               <a:ext uri="{91240B29-F687-4f45-9708-019B960494DF}">
-                <a14:hiddenLine xmlns:a14="http://schemas.microsoft.com/office/drawing/2010/main" xmlns="" w="9525">
+                <a14:hiddenLine xmlns="" xmlns:a14="http://schemas.microsoft.com/office/drawing/2010/main" w="9525">
                   <a:solidFill>
                     <a:srgbClr val="000000"/>
                   </a:solidFill>
@@ -2871,7 +2879,7 @@
             </a:ln>
             <a:extLst>
               <a:ext uri="{91240B29-F687-4f45-9708-019B960494DF}">
-                <a14:hiddenLine xmlns:a14="http://schemas.microsoft.com/office/drawing/2010/main" xmlns="" w="9525">
+                <a14:hiddenLine xmlns="" xmlns:a14="http://schemas.microsoft.com/office/drawing/2010/main" w="9525">
                   <a:solidFill>
                     <a:srgbClr val="000000"/>
                   </a:solidFill>
@@ -2933,7 +2941,7 @@
             </a:ln>
             <a:extLst>
               <a:ext uri="{91240B29-F687-4f45-9708-019B960494DF}">
-                <a14:hiddenLine xmlns:a14="http://schemas.microsoft.com/office/drawing/2010/main" xmlns="" w="9525">
+                <a14:hiddenLine xmlns="" xmlns:a14="http://schemas.microsoft.com/office/drawing/2010/main" w="9525">
                   <a:solidFill>
                     <a:srgbClr val="000000"/>
                   </a:solidFill>
@@ -3023,7 +3031,7 @@
             </a:ln>
             <a:extLst>
               <a:ext uri="{91240B29-F687-4f45-9708-019B960494DF}">
-                <a14:hiddenLine xmlns:a14="http://schemas.microsoft.com/office/drawing/2010/main" xmlns="" w="9525">
+                <a14:hiddenLine xmlns="" xmlns:a14="http://schemas.microsoft.com/office/drawing/2010/main" w="9525">
                   <a:solidFill>
                     <a:srgbClr val="000000"/>
                   </a:solidFill>
@@ -3085,7 +3093,7 @@
             </a:ln>
             <a:extLst>
               <a:ext uri="{91240B29-F687-4f45-9708-019B960494DF}">
-                <a14:hiddenLine xmlns:a14="http://schemas.microsoft.com/office/drawing/2010/main" xmlns="" w="9525">
+                <a14:hiddenLine xmlns="" xmlns:a14="http://schemas.microsoft.com/office/drawing/2010/main" w="9525">
                   <a:solidFill>
                     <a:srgbClr val="000000"/>
                   </a:solidFill>
@@ -3175,7 +3183,7 @@
             </a:ln>
             <a:extLst>
               <a:ext uri="{91240B29-F687-4f45-9708-019B960494DF}">
-                <a14:hiddenLine xmlns:a14="http://schemas.microsoft.com/office/drawing/2010/main" xmlns="" w="9525">
+                <a14:hiddenLine xmlns="" xmlns:a14="http://schemas.microsoft.com/office/drawing/2010/main" w="9525">
                   <a:solidFill>
                     <a:srgbClr val="000000"/>
                   </a:solidFill>
@@ -3209,7 +3217,7 @@
             </a:ln>
             <a:extLst>
               <a:ext uri="{91240B29-F687-4f45-9708-019B960494DF}">
-                <a14:hiddenLine xmlns:a14="http://schemas.microsoft.com/office/drawing/2010/main" xmlns="" w="9525">
+                <a14:hiddenLine xmlns="" xmlns:a14="http://schemas.microsoft.com/office/drawing/2010/main" w="9525">
                   <a:solidFill>
                     <a:srgbClr val="000000"/>
                   </a:solidFill>
@@ -3274,7 +3282,7 @@
             </a:ln>
             <a:extLst>
               <a:ext uri="{91240B29-F687-4f45-9708-019B960494DF}">
-                <a14:hiddenLine xmlns:a14="http://schemas.microsoft.com/office/drawing/2010/main" xmlns="" w="9525">
+                <a14:hiddenLine xmlns="" xmlns:a14="http://schemas.microsoft.com/office/drawing/2010/main" w="9525">
                   <a:solidFill>
                     <a:srgbClr val="000000"/>
                   </a:solidFill>
@@ -3364,7 +3372,7 @@
             </a:ln>
             <a:extLst>
               <a:ext uri="{91240B29-F687-4f45-9708-019B960494DF}">
-                <a14:hiddenLine xmlns:a14="http://schemas.microsoft.com/office/drawing/2010/main" xmlns="" w="9525">
+                <a14:hiddenLine xmlns="" xmlns:a14="http://schemas.microsoft.com/office/drawing/2010/main" w="9525">
                   <a:solidFill>
                     <a:srgbClr val="000000"/>
                   </a:solidFill>
@@ -3426,7 +3434,7 @@
             </a:ln>
             <a:extLst>
               <a:ext uri="{91240B29-F687-4f45-9708-019B960494DF}">
-                <a14:hiddenLine xmlns:a14="http://schemas.microsoft.com/office/drawing/2010/main" xmlns="" w="9525">
+                <a14:hiddenLine xmlns="" xmlns:a14="http://schemas.microsoft.com/office/drawing/2010/main" w="9525">
                   <a:solidFill>
                     <a:srgbClr val="000000"/>
                   </a:solidFill>
@@ -3516,7 +3524,7 @@
             </a:ln>
             <a:extLst>
               <a:ext uri="{91240B29-F687-4f45-9708-019B960494DF}">
-                <a14:hiddenLine xmlns:a14="http://schemas.microsoft.com/office/drawing/2010/main" xmlns="" w="9525">
+                <a14:hiddenLine xmlns="" xmlns:a14="http://schemas.microsoft.com/office/drawing/2010/main" w="9525">
                   <a:solidFill>
                     <a:srgbClr val="000000"/>
                   </a:solidFill>
@@ -3606,7 +3614,7 @@
             </a:ln>
             <a:extLst>
               <a:ext uri="{91240B29-F687-4f45-9708-019B960494DF}">
-                <a14:hiddenLine xmlns:a14="http://schemas.microsoft.com/office/drawing/2010/main" xmlns="" w="9525">
+                <a14:hiddenLine xmlns="" xmlns:a14="http://schemas.microsoft.com/office/drawing/2010/main" w="9525">
                   <a:solidFill>
                     <a:srgbClr val="000000"/>
                   </a:solidFill>
@@ -3671,7 +3679,7 @@
             </a:ln>
             <a:extLst>
               <a:ext uri="{91240B29-F687-4f45-9708-019B960494DF}">
-                <a14:hiddenLine xmlns:a14="http://schemas.microsoft.com/office/drawing/2010/main" xmlns="" w="9525">
+                <a14:hiddenLine xmlns="" xmlns:a14="http://schemas.microsoft.com/office/drawing/2010/main" w="9525">
                   <a:solidFill>
                     <a:srgbClr val="000000"/>
                   </a:solidFill>
@@ -3733,7 +3741,7 @@
             </a:ln>
             <a:extLst>
               <a:ext uri="{91240B29-F687-4f45-9708-019B960494DF}">
-                <a14:hiddenLine xmlns:a14="http://schemas.microsoft.com/office/drawing/2010/main" xmlns="" w="9525">
+                <a14:hiddenLine xmlns="" xmlns:a14="http://schemas.microsoft.com/office/drawing/2010/main" w="9525">
                   <a:solidFill>
                     <a:srgbClr val="000000"/>
                   </a:solidFill>
@@ -3823,7 +3831,7 @@
             </a:ln>
             <a:extLst>
               <a:ext uri="{91240B29-F687-4f45-9708-019B960494DF}">
-                <a14:hiddenLine xmlns:a14="http://schemas.microsoft.com/office/drawing/2010/main" xmlns="" w="9525">
+                <a14:hiddenLine xmlns="" xmlns:a14="http://schemas.microsoft.com/office/drawing/2010/main" w="9525">
                   <a:solidFill>
                     <a:srgbClr val="000000"/>
                   </a:solidFill>
@@ -3913,7 +3921,7 @@
             </a:ln>
             <a:extLst>
               <a:ext uri="{91240B29-F687-4f45-9708-019B960494DF}">
-                <a14:hiddenLine xmlns:a14="http://schemas.microsoft.com/office/drawing/2010/main" xmlns="" w="9525">
+                <a14:hiddenLine xmlns="" xmlns:a14="http://schemas.microsoft.com/office/drawing/2010/main" w="9525">
                   <a:solidFill>
                     <a:srgbClr val="000000"/>
                   </a:solidFill>
@@ -3975,7 +3983,7 @@
             </a:ln>
             <a:extLst>
               <a:ext uri="{91240B29-F687-4f45-9708-019B960494DF}">
-                <a14:hiddenLine xmlns:a14="http://schemas.microsoft.com/office/drawing/2010/main" xmlns="" w="9525">
+                <a14:hiddenLine xmlns="" xmlns:a14="http://schemas.microsoft.com/office/drawing/2010/main" w="9525">
                   <a:solidFill>
                     <a:srgbClr val="000000"/>
                   </a:solidFill>
@@ -4095,7 +4103,7 @@
             </a:ln>
             <a:extLst>
               <a:ext uri="{91240B29-F687-4f45-9708-019B960494DF}">
-                <a14:hiddenLine xmlns:a14="http://schemas.microsoft.com/office/drawing/2010/main" xmlns="" w="9525">
+                <a14:hiddenLine xmlns="" xmlns:a14="http://schemas.microsoft.com/office/drawing/2010/main" w="9525">
                   <a:solidFill>
                     <a:srgbClr val="000000"/>
                   </a:solidFill>
@@ -4163,7 +4171,7 @@
             </a:ln>
             <a:extLst>
               <a:ext uri="{91240B29-F687-4f45-9708-019B960494DF}">
-                <a14:hiddenLine xmlns:a14="http://schemas.microsoft.com/office/drawing/2010/main" xmlns="" w="9525">
+                <a14:hiddenLine xmlns="" xmlns:a14="http://schemas.microsoft.com/office/drawing/2010/main" w="9525">
                   <a:solidFill>
                     <a:srgbClr val="000000"/>
                   </a:solidFill>
@@ -4253,7 +4261,7 @@
             </a:ln>
             <a:extLst>
               <a:ext uri="{91240B29-F687-4f45-9708-019B960494DF}">
-                <a14:hiddenLine xmlns:a14="http://schemas.microsoft.com/office/drawing/2010/main" xmlns="" w="9525">
+                <a14:hiddenLine xmlns="" xmlns:a14="http://schemas.microsoft.com/office/drawing/2010/main" w="9525">
                   <a:solidFill>
                     <a:srgbClr val="000000"/>
                   </a:solidFill>
@@ -4393,7 +4401,7 @@
           <a:p>
             <a:fld id="{48A87A34-81AB-432B-8DAE-1953F412C126}" type="datetimeFigureOut">
               <a:rPr lang="en-US" smtClean="0"/>
-              <a:t>6/18/2019</a:t>
+              <a:t>8/2/2019</a:t>
             </a:fld>
             <a:endParaRPr lang="en-US" dirty="0"/>
           </a:p>
@@ -4666,7 +4674,7 @@
             <a:fld id="{48A87A34-81AB-432B-8DAE-1953F412C126}" type="datetimeFigureOut">
               <a:rPr lang="en-US" smtClean="0"/>
               <a:pPr/>
-              <a:t>6/18/2019</a:t>
+              <a:t>8/2/2019</a:t>
             </a:fld>
             <a:endParaRPr lang="en-US" dirty="0"/>
           </a:p>
@@ -4864,7 +4872,7 @@
             <a:fld id="{48A87A34-81AB-432B-8DAE-1953F412C126}" type="datetimeFigureOut">
               <a:rPr lang="en-US" smtClean="0"/>
               <a:pPr/>
-              <a:t>6/18/2019</a:t>
+              <a:t>8/2/2019</a:t>
             </a:fld>
             <a:endParaRPr lang="en-US" dirty="0"/>
           </a:p>
@@ -5129,7 +5137,7 @@
             <a:fld id="{48A87A34-81AB-432B-8DAE-1953F412C126}" type="datetimeFigureOut">
               <a:rPr lang="en-US" smtClean="0"/>
               <a:pPr/>
-              <a:t>6/18/2019</a:t>
+              <a:t>8/2/2019</a:t>
             </a:fld>
             <a:endParaRPr lang="en-US" dirty="0"/>
           </a:p>
@@ -5565,7 +5573,7 @@
             <a:fld id="{48A87A34-81AB-432B-8DAE-1953F412C126}" type="datetimeFigureOut">
               <a:rPr lang="en-US" smtClean="0"/>
               <a:pPr/>
-              <a:t>6/18/2019</a:t>
+              <a:t>8/2/2019</a:t>
             </a:fld>
             <a:endParaRPr lang="en-US" dirty="0"/>
           </a:p>
@@ -6113,7 +6121,7 @@
             <a:fld id="{48A87A34-81AB-432B-8DAE-1953F412C126}" type="datetimeFigureOut">
               <a:rPr lang="en-US" smtClean="0"/>
               <a:pPr/>
-              <a:t>6/18/2019</a:t>
+              <a:t>8/2/2019</a:t>
             </a:fld>
             <a:endParaRPr lang="en-US" dirty="0"/>
           </a:p>
@@ -6835,7 +6843,7 @@
             <a:fld id="{48A87A34-81AB-432B-8DAE-1953F412C126}" type="datetimeFigureOut">
               <a:rPr lang="en-US" smtClean="0"/>
               <a:pPr/>
-              <a:t>6/18/2019</a:t>
+              <a:t>8/2/2019</a:t>
             </a:fld>
             <a:endParaRPr lang="en-US" dirty="0"/>
           </a:p>
@@ -7006,7 +7014,7 @@
           <a:p>
             <a:fld id="{48A87A34-81AB-432B-8DAE-1953F412C126}" type="datetimeFigureOut">
               <a:rPr lang="en-US" smtClean="0"/>
-              <a:t>6/18/2019</a:t>
+              <a:t>8/2/2019</a:t>
             </a:fld>
             <a:endParaRPr lang="en-US" dirty="0"/>
           </a:p>
@@ -7186,7 +7194,7 @@
           <a:p>
             <a:fld id="{48A87A34-81AB-432B-8DAE-1953F412C126}" type="datetimeFigureOut">
               <a:rPr lang="en-US" smtClean="0"/>
-              <a:t>6/18/2019</a:t>
+              <a:t>8/2/2019</a:t>
             </a:fld>
             <a:endParaRPr lang="en-US" dirty="0"/>
           </a:p>
@@ -7361,7 +7369,7 @@
           <a:p>
             <a:fld id="{48A87A34-81AB-432B-8DAE-1953F412C126}" type="datetimeFigureOut">
               <a:rPr lang="en-US" smtClean="0"/>
-              <a:t>6/18/2019</a:t>
+              <a:t>8/2/2019</a:t>
             </a:fld>
             <a:endParaRPr lang="en-US" dirty="0"/>
           </a:p>
@@ -7611,7 +7619,7 @@
           <a:p>
             <a:fld id="{48A87A34-81AB-432B-8DAE-1953F412C126}" type="datetimeFigureOut">
               <a:rPr lang="en-US" smtClean="0"/>
-              <a:t>6/18/2019</a:t>
+              <a:t>8/2/2019</a:t>
             </a:fld>
             <a:endParaRPr lang="en-US" dirty="0"/>
           </a:p>
@@ -7848,7 +7856,7 @@
           <a:p>
             <a:fld id="{48A87A34-81AB-432B-8DAE-1953F412C126}" type="datetimeFigureOut">
               <a:rPr lang="en-US" smtClean="0"/>
-              <a:t>6/18/2019</a:t>
+              <a:t>8/2/2019</a:t>
             </a:fld>
             <a:endParaRPr lang="en-US" dirty="0"/>
           </a:p>
@@ -8229,7 +8237,7 @@
           <a:p>
             <a:fld id="{48A87A34-81AB-432B-8DAE-1953F412C126}" type="datetimeFigureOut">
               <a:rPr lang="en-US" smtClean="0"/>
-              <a:t>6/18/2019</a:t>
+              <a:t>8/2/2019</a:t>
             </a:fld>
             <a:endParaRPr lang="en-US" dirty="0"/>
           </a:p>
@@ -8347,7 +8355,7 @@
           <a:p>
             <a:fld id="{48A87A34-81AB-432B-8DAE-1953F412C126}" type="datetimeFigureOut">
               <a:rPr lang="en-US" smtClean="0"/>
-              <a:t>6/18/2019</a:t>
+              <a:t>8/2/2019</a:t>
             </a:fld>
             <a:endParaRPr lang="en-US" dirty="0"/>
           </a:p>
@@ -8442,7 +8450,7 @@
           <a:p>
             <a:fld id="{48A87A34-81AB-432B-8DAE-1953F412C126}" type="datetimeFigureOut">
               <a:rPr lang="en-US" smtClean="0"/>
-              <a:t>6/18/2019</a:t>
+              <a:t>8/2/2019</a:t>
             </a:fld>
             <a:endParaRPr lang="en-US" dirty="0"/>
           </a:p>
@@ -8691,7 +8699,7 @@
           <a:p>
             <a:fld id="{48A87A34-81AB-432B-8DAE-1953F412C126}" type="datetimeFigureOut">
               <a:rPr lang="en-US" smtClean="0"/>
-              <a:t>6/18/2019</a:t>
+              <a:t>8/2/2019</a:t>
             </a:fld>
             <a:endParaRPr lang="en-US" dirty="0"/>
           </a:p>
@@ -8971,7 +8979,7 @@
           <a:p>
             <a:fld id="{48A87A34-81AB-432B-8DAE-1953F412C126}" type="datetimeFigureOut">
               <a:rPr lang="en-US" smtClean="0"/>
-              <a:t>6/18/2019</a:t>
+              <a:t>8/2/2019</a:t>
             </a:fld>
             <a:endParaRPr lang="en-US" dirty="0"/>
           </a:p>
@@ -9087,7 +9095,7 @@
           <a:noFill/>
           <a:extLst>
             <a:ext uri="{909E8E84-426E-40dd-AFC4-6F175D3DCCD1}">
-              <a14:hiddenFill xmlns:a14="http://schemas.microsoft.com/office/drawing/2010/main" xmlns="">
+              <a14:hiddenFill xmlns="" xmlns:a14="http://schemas.microsoft.com/office/drawing/2010/main">
                 <a:solidFill>
                   <a:srgbClr val="FFFFFF"/>
                 </a:solidFill>
@@ -9161,7 +9169,7 @@
               </a:ln>
               <a:extLst>
                 <a:ext uri="{91240B29-F687-4f45-9708-019B960494DF}">
-                  <a14:hiddenLine xmlns:a14="http://schemas.microsoft.com/office/drawing/2010/main" xmlns="" w="9525">
+                  <a14:hiddenLine xmlns="" xmlns:a14="http://schemas.microsoft.com/office/drawing/2010/main" w="9525">
                     <a:solidFill>
                       <a:srgbClr val="000000"/>
                     </a:solidFill>
@@ -9251,7 +9259,7 @@
               </a:ln>
               <a:extLst>
                 <a:ext uri="{91240B29-F687-4f45-9708-019B960494DF}">
-                  <a14:hiddenLine xmlns:a14="http://schemas.microsoft.com/office/drawing/2010/main" xmlns="" w="9525">
+                  <a14:hiddenLine xmlns="" xmlns:a14="http://schemas.microsoft.com/office/drawing/2010/main" w="9525">
                     <a:solidFill>
                       <a:srgbClr val="000000"/>
                     </a:solidFill>
@@ -9341,7 +9349,7 @@
               </a:ln>
               <a:extLst>
                 <a:ext uri="{91240B29-F687-4f45-9708-019B960494DF}">
-                  <a14:hiddenLine xmlns:a14="http://schemas.microsoft.com/office/drawing/2010/main" xmlns="" w="9525">
+                  <a14:hiddenLine xmlns="" xmlns:a14="http://schemas.microsoft.com/office/drawing/2010/main" w="9525">
                     <a:solidFill>
                       <a:srgbClr val="000000"/>
                     </a:solidFill>
@@ -9403,7 +9411,7 @@
               </a:ln>
               <a:extLst>
                 <a:ext uri="{91240B29-F687-4f45-9708-019B960494DF}">
-                  <a14:hiddenLine xmlns:a14="http://schemas.microsoft.com/office/drawing/2010/main" xmlns="" w="9525">
+                  <a14:hiddenLine xmlns="" xmlns:a14="http://schemas.microsoft.com/office/drawing/2010/main" w="9525">
                     <a:solidFill>
                       <a:srgbClr val="000000"/>
                     </a:solidFill>
@@ -9493,7 +9501,7 @@
               </a:ln>
               <a:extLst>
                 <a:ext uri="{91240B29-F687-4f45-9708-019B960494DF}">
-                  <a14:hiddenLine xmlns:a14="http://schemas.microsoft.com/office/drawing/2010/main" xmlns="" w="9525">
+                  <a14:hiddenLine xmlns="" xmlns:a14="http://schemas.microsoft.com/office/drawing/2010/main" w="9525">
                     <a:solidFill>
                       <a:srgbClr val="000000"/>
                     </a:solidFill>
@@ -9555,7 +9563,7 @@
               </a:ln>
               <a:extLst>
                 <a:ext uri="{91240B29-F687-4f45-9708-019B960494DF}">
-                  <a14:hiddenLine xmlns:a14="http://schemas.microsoft.com/office/drawing/2010/main" xmlns="" w="9525">
+                  <a14:hiddenLine xmlns="" xmlns:a14="http://schemas.microsoft.com/office/drawing/2010/main" w="9525">
                     <a:solidFill>
                       <a:srgbClr val="000000"/>
                     </a:solidFill>
@@ -9617,7 +9625,7 @@
               </a:ln>
               <a:extLst>
                 <a:ext uri="{91240B29-F687-4f45-9708-019B960494DF}">
-                  <a14:hiddenLine xmlns:a14="http://schemas.microsoft.com/office/drawing/2010/main" xmlns="" w="9525">
+                  <a14:hiddenLine xmlns="" xmlns:a14="http://schemas.microsoft.com/office/drawing/2010/main" w="9525">
                     <a:solidFill>
                       <a:srgbClr val="000000"/>
                     </a:solidFill>
@@ -9707,7 +9715,7 @@
               </a:ln>
               <a:extLst>
                 <a:ext uri="{91240B29-F687-4f45-9708-019B960494DF}">
-                  <a14:hiddenLine xmlns:a14="http://schemas.microsoft.com/office/drawing/2010/main" xmlns="" w="9525">
+                  <a14:hiddenLine xmlns="" xmlns:a14="http://schemas.microsoft.com/office/drawing/2010/main" w="9525">
                     <a:solidFill>
                       <a:srgbClr val="000000"/>
                     </a:solidFill>
@@ -9797,7 +9805,7 @@
               </a:ln>
               <a:extLst>
                 <a:ext uri="{91240B29-F687-4f45-9708-019B960494DF}">
-                  <a14:hiddenLine xmlns:a14="http://schemas.microsoft.com/office/drawing/2010/main" xmlns="" w="9525">
+                  <a14:hiddenLine xmlns="" xmlns:a14="http://schemas.microsoft.com/office/drawing/2010/main" w="9525">
                     <a:solidFill>
                       <a:srgbClr val="000000"/>
                     </a:solidFill>
@@ -9859,7 +9867,7 @@
               </a:ln>
               <a:extLst>
                 <a:ext uri="{91240B29-F687-4f45-9708-019B960494DF}">
-                  <a14:hiddenLine xmlns:a14="http://schemas.microsoft.com/office/drawing/2010/main" xmlns="" w="9525">
+                  <a14:hiddenLine xmlns="" xmlns:a14="http://schemas.microsoft.com/office/drawing/2010/main" w="9525">
                     <a:solidFill>
                       <a:srgbClr val="000000"/>
                     </a:solidFill>
@@ -9969,7 +9977,7 @@
               </a:ln>
               <a:extLst>
                 <a:ext uri="{91240B29-F687-4f45-9708-019B960494DF}">
-                  <a14:hiddenLine xmlns:a14="http://schemas.microsoft.com/office/drawing/2010/main" xmlns="" w="9525">
+                  <a14:hiddenLine xmlns="" xmlns:a14="http://schemas.microsoft.com/office/drawing/2010/main" w="9525">
                     <a:solidFill>
                       <a:srgbClr val="000000"/>
                     </a:solidFill>
@@ -10053,7 +10061,7 @@
               </a:ln>
               <a:extLst>
                 <a:ext uri="{91240B29-F687-4f45-9708-019B960494DF}">
-                  <a14:hiddenLine xmlns:a14="http://schemas.microsoft.com/office/drawing/2010/main" xmlns="" w="9525">
+                  <a14:hiddenLine xmlns="" xmlns:a14="http://schemas.microsoft.com/office/drawing/2010/main" w="9525">
                     <a:solidFill>
                       <a:srgbClr val="000000"/>
                     </a:solidFill>
@@ -10115,7 +10123,7 @@
               </a:ln>
               <a:extLst>
                 <a:ext uri="{91240B29-F687-4f45-9708-019B960494DF}">
-                  <a14:hiddenLine xmlns:a14="http://schemas.microsoft.com/office/drawing/2010/main" xmlns="" w="9525">
+                  <a14:hiddenLine xmlns="" xmlns:a14="http://schemas.microsoft.com/office/drawing/2010/main" w="9525">
                     <a:solidFill>
                       <a:srgbClr val="000000"/>
                     </a:solidFill>
@@ -10177,7 +10185,7 @@
               </a:ln>
               <a:extLst>
                 <a:ext uri="{91240B29-F687-4f45-9708-019B960494DF}">
-                  <a14:hiddenLine xmlns:a14="http://schemas.microsoft.com/office/drawing/2010/main" xmlns="" w="9525">
+                  <a14:hiddenLine xmlns="" xmlns:a14="http://schemas.microsoft.com/office/drawing/2010/main" w="9525">
                     <a:solidFill>
                       <a:srgbClr val="000000"/>
                     </a:solidFill>
@@ -10267,7 +10275,7 @@
               </a:ln>
               <a:extLst>
                 <a:ext uri="{91240B29-F687-4f45-9708-019B960494DF}">
-                  <a14:hiddenLine xmlns:a14="http://schemas.microsoft.com/office/drawing/2010/main" xmlns="" w="9525">
+                  <a14:hiddenLine xmlns="" xmlns:a14="http://schemas.microsoft.com/office/drawing/2010/main" w="9525">
                     <a:solidFill>
                       <a:srgbClr val="000000"/>
                     </a:solidFill>
@@ -10301,7 +10309,7 @@
               </a:ln>
               <a:extLst>
                 <a:ext uri="{91240B29-F687-4f45-9708-019B960494DF}">
-                  <a14:hiddenLine xmlns:a14="http://schemas.microsoft.com/office/drawing/2010/main" xmlns="" w="9525">
+                  <a14:hiddenLine xmlns="" xmlns:a14="http://schemas.microsoft.com/office/drawing/2010/main" w="9525">
                     <a:solidFill>
                       <a:srgbClr val="000000"/>
                     </a:solidFill>
@@ -10366,7 +10374,7 @@
               </a:ln>
               <a:extLst>
                 <a:ext uri="{91240B29-F687-4f45-9708-019B960494DF}">
-                  <a14:hiddenLine xmlns:a14="http://schemas.microsoft.com/office/drawing/2010/main" xmlns="" w="9525">
+                  <a14:hiddenLine xmlns="" xmlns:a14="http://schemas.microsoft.com/office/drawing/2010/main" w="9525">
                     <a:solidFill>
                       <a:srgbClr val="000000"/>
                     </a:solidFill>
@@ -10456,7 +10464,7 @@
               </a:ln>
               <a:extLst>
                 <a:ext uri="{91240B29-F687-4f45-9708-019B960494DF}">
-                  <a14:hiddenLine xmlns:a14="http://schemas.microsoft.com/office/drawing/2010/main" xmlns="" w="9525">
+                  <a14:hiddenLine xmlns="" xmlns:a14="http://schemas.microsoft.com/office/drawing/2010/main" w="9525">
                     <a:solidFill>
                       <a:srgbClr val="000000"/>
                     </a:solidFill>
@@ -10518,7 +10526,7 @@
               </a:ln>
               <a:extLst>
                 <a:ext uri="{91240B29-F687-4f45-9708-019B960494DF}">
-                  <a14:hiddenLine xmlns:a14="http://schemas.microsoft.com/office/drawing/2010/main" xmlns="" w="9525">
+                  <a14:hiddenLine xmlns="" xmlns:a14="http://schemas.microsoft.com/office/drawing/2010/main" w="9525">
                     <a:solidFill>
                       <a:srgbClr val="000000"/>
                     </a:solidFill>
@@ -10608,7 +10616,7 @@
               </a:ln>
               <a:extLst>
                 <a:ext uri="{91240B29-F687-4f45-9708-019B960494DF}">
-                  <a14:hiddenLine xmlns:a14="http://schemas.microsoft.com/office/drawing/2010/main" xmlns="" w="9525">
+                  <a14:hiddenLine xmlns="" xmlns:a14="http://schemas.microsoft.com/office/drawing/2010/main" w="9525">
                     <a:solidFill>
                       <a:srgbClr val="000000"/>
                     </a:solidFill>
@@ -10673,7 +10681,7 @@
               </a:ln>
               <a:extLst>
                 <a:ext uri="{91240B29-F687-4f45-9708-019B960494DF}">
-                  <a14:hiddenLine xmlns:a14="http://schemas.microsoft.com/office/drawing/2010/main" xmlns="" w="9525">
+                  <a14:hiddenLine xmlns="" xmlns:a14="http://schemas.microsoft.com/office/drawing/2010/main" w="9525">
                     <a:solidFill>
                       <a:srgbClr val="000000"/>
                     </a:solidFill>
@@ -10735,7 +10743,7 @@
               </a:ln>
               <a:extLst>
                 <a:ext uri="{91240B29-F687-4f45-9708-019B960494DF}">
-                  <a14:hiddenLine xmlns:a14="http://schemas.microsoft.com/office/drawing/2010/main" xmlns="" w="9525">
+                  <a14:hiddenLine xmlns="" xmlns:a14="http://schemas.microsoft.com/office/drawing/2010/main" w="9525">
                     <a:solidFill>
                       <a:srgbClr val="000000"/>
                     </a:solidFill>
@@ -10825,7 +10833,7 @@
               </a:ln>
               <a:extLst>
                 <a:ext uri="{91240B29-F687-4f45-9708-019B960494DF}">
-                  <a14:hiddenLine xmlns:a14="http://schemas.microsoft.com/office/drawing/2010/main" xmlns="" w="9525">
+                  <a14:hiddenLine xmlns="" xmlns:a14="http://schemas.microsoft.com/office/drawing/2010/main" w="9525">
                     <a:solidFill>
                       <a:srgbClr val="000000"/>
                     </a:solidFill>
@@ -10915,7 +10923,7 @@
               </a:ln>
               <a:extLst>
                 <a:ext uri="{91240B29-F687-4f45-9708-019B960494DF}">
-                  <a14:hiddenLine xmlns:a14="http://schemas.microsoft.com/office/drawing/2010/main" xmlns="" w="9525">
+                  <a14:hiddenLine xmlns="" xmlns:a14="http://schemas.microsoft.com/office/drawing/2010/main" w="9525">
                     <a:solidFill>
                       <a:srgbClr val="000000"/>
                     </a:solidFill>
@@ -10980,7 +10988,7 @@
               </a:ln>
               <a:extLst>
                 <a:ext uri="{91240B29-F687-4f45-9708-019B960494DF}">
-                  <a14:hiddenLine xmlns:a14="http://schemas.microsoft.com/office/drawing/2010/main" xmlns="" w="9525">
+                  <a14:hiddenLine xmlns="" xmlns:a14="http://schemas.microsoft.com/office/drawing/2010/main" w="9525">
                     <a:solidFill>
                       <a:srgbClr val="000000"/>
                     </a:solidFill>
@@ -11100,7 +11108,7 @@
               </a:ln>
               <a:extLst>
                 <a:ext uri="{91240B29-F687-4f45-9708-019B960494DF}">
-                  <a14:hiddenLine xmlns:a14="http://schemas.microsoft.com/office/drawing/2010/main" xmlns="" w="9525">
+                  <a14:hiddenLine xmlns="" xmlns:a14="http://schemas.microsoft.com/office/drawing/2010/main" w="9525">
                     <a:solidFill>
                       <a:srgbClr val="000000"/>
                     </a:solidFill>
@@ -11198,7 +11206,7 @@
               </a:ln>
               <a:extLst>
                 <a:ext uri="{91240B29-F687-4f45-9708-019B960494DF}">
-                  <a14:hiddenLine xmlns:a14="http://schemas.microsoft.com/office/drawing/2010/main" xmlns="" w="9525">
+                  <a14:hiddenLine xmlns="" xmlns:a14="http://schemas.microsoft.com/office/drawing/2010/main" w="9525">
                     <a:solidFill>
                       <a:srgbClr val="000000"/>
                     </a:solidFill>
@@ -11313,7 +11321,7 @@
               </a:ln>
               <a:extLst>
                 <a:ext uri="{91240B29-F687-4f45-9708-019B960494DF}">
-                  <a14:hiddenLine xmlns:a14="http://schemas.microsoft.com/office/drawing/2010/main" xmlns="" w="9525">
+                  <a14:hiddenLine xmlns="" xmlns:a14="http://schemas.microsoft.com/office/drawing/2010/main" w="9525">
                     <a:solidFill>
                       <a:srgbClr val="000000"/>
                     </a:solidFill>
@@ -11403,7 +11411,7 @@
               </a:ln>
               <a:extLst>
                 <a:ext uri="{91240B29-F687-4f45-9708-019B960494DF}">
-                  <a14:hiddenLine xmlns:a14="http://schemas.microsoft.com/office/drawing/2010/main" xmlns="" w="9525">
+                  <a14:hiddenLine xmlns="" xmlns:a14="http://schemas.microsoft.com/office/drawing/2010/main" w="9525">
                     <a:solidFill>
                       <a:srgbClr val="000000"/>
                     </a:solidFill>
@@ -11468,7 +11476,7 @@
               </a:ln>
               <a:extLst>
                 <a:ext uri="{91240B29-F687-4f45-9708-019B960494DF}">
-                  <a14:hiddenLine xmlns:a14="http://schemas.microsoft.com/office/drawing/2010/main" xmlns="" w="9525">
+                  <a14:hiddenLine xmlns="" xmlns:a14="http://schemas.microsoft.com/office/drawing/2010/main" w="9525">
                     <a:solidFill>
                       <a:srgbClr val="000000"/>
                     </a:solidFill>
@@ -11558,7 +11566,7 @@
               </a:ln>
               <a:extLst>
                 <a:ext uri="{91240B29-F687-4f45-9708-019B960494DF}">
-                  <a14:hiddenLine xmlns:a14="http://schemas.microsoft.com/office/drawing/2010/main" xmlns="" w="9525">
+                  <a14:hiddenLine xmlns="" xmlns:a14="http://schemas.microsoft.com/office/drawing/2010/main" w="9525">
                     <a:solidFill>
                       <a:srgbClr val="000000"/>
                     </a:solidFill>
@@ -11626,7 +11634,7 @@
               </a:ln>
               <a:extLst>
                 <a:ext uri="{91240B29-F687-4f45-9708-019B960494DF}">
-                  <a14:hiddenLine xmlns:a14="http://schemas.microsoft.com/office/drawing/2010/main" xmlns="" w="9525">
+                  <a14:hiddenLine xmlns="" xmlns:a14="http://schemas.microsoft.com/office/drawing/2010/main" w="9525">
                     <a:solidFill>
                       <a:srgbClr val="000000"/>
                     </a:solidFill>
@@ -11716,7 +11724,7 @@
               </a:ln>
               <a:extLst>
                 <a:ext uri="{91240B29-F687-4f45-9708-019B960494DF}">
-                  <a14:hiddenLine xmlns:a14="http://schemas.microsoft.com/office/drawing/2010/main" xmlns="" w="9525">
+                  <a14:hiddenLine xmlns="" xmlns:a14="http://schemas.microsoft.com/office/drawing/2010/main" w="9525">
                     <a:solidFill>
                       <a:srgbClr val="000000"/>
                     </a:solidFill>
@@ -11784,7 +11792,7 @@
               </a:ln>
               <a:extLst>
                 <a:ext uri="{91240B29-F687-4f45-9708-019B960494DF}">
-                  <a14:hiddenLine xmlns:a14="http://schemas.microsoft.com/office/drawing/2010/main" xmlns="" w="9525">
+                  <a14:hiddenLine xmlns="" xmlns:a14="http://schemas.microsoft.com/office/drawing/2010/main" w="9525">
                     <a:solidFill>
                       <a:srgbClr val="000000"/>
                     </a:solidFill>
@@ -11874,7 +11882,7 @@
               </a:ln>
               <a:extLst>
                 <a:ext uri="{91240B29-F687-4f45-9708-019B960494DF}">
-                  <a14:hiddenLine xmlns:a14="http://schemas.microsoft.com/office/drawing/2010/main" xmlns="" w="9525">
+                  <a14:hiddenLine xmlns="" xmlns:a14="http://schemas.microsoft.com/office/drawing/2010/main" w="9525">
                     <a:solidFill>
                       <a:srgbClr val="000000"/>
                     </a:solidFill>
@@ -11908,7 +11916,7 @@
               </a:ln>
               <a:extLst>
                 <a:ext uri="{91240B29-F687-4f45-9708-019B960494DF}">
-                  <a14:hiddenLine xmlns:a14="http://schemas.microsoft.com/office/drawing/2010/main" xmlns="" w="9525">
+                  <a14:hiddenLine xmlns="" xmlns:a14="http://schemas.microsoft.com/office/drawing/2010/main" w="9525">
                     <a:solidFill>
                       <a:srgbClr val="000000"/>
                     </a:solidFill>
@@ -12049,7 +12057,7 @@
             <a:fld id="{48A87A34-81AB-432B-8DAE-1953F412C126}" type="datetimeFigureOut">
               <a:rPr lang="en-US" smtClean="0"/>
               <a:pPr/>
-              <a:t>6/18/2019</a:t>
+              <a:t>8/2/2019</a:t>
             </a:fld>
             <a:endParaRPr lang="en-US" dirty="0"/>
           </a:p>
@@ -12569,6 +12577,341 @@
             <p:ph type="title"/>
           </p:nvPr>
         </p:nvSpPr>
+        <p:spPr/>
+        <p:txBody>
+          <a:bodyPr/>
+          <a:lstStyle/>
+          <a:p>
+            <a:r>
+              <a:rPr lang="en-US" dirty="0" smtClean="0"/>
+              <a:t>Supervised methods</a:t>
+            </a:r>
+            <a:endParaRPr lang="en-US" dirty="0"/>
+          </a:p>
+        </p:txBody>
+      </p:sp>
+      <p:sp>
+        <p:nvSpPr>
+          <p:cNvPr id="3" name="Content Placeholder 2"/>
+          <p:cNvSpPr>
+            <a:spLocks noGrp="1"/>
+          </p:cNvSpPr>
+          <p:nvPr>
+            <p:ph idx="1"/>
+          </p:nvPr>
+        </p:nvSpPr>
+        <p:spPr/>
+        <p:txBody>
+          <a:bodyPr/>
+          <a:lstStyle/>
+          <a:p>
+            <a:r>
+              <a:rPr lang="en-US" dirty="0" smtClean="0"/>
+              <a:t>Every input is independent and has an associated label: f(x) = y</a:t>
+            </a:r>
+          </a:p>
+          <a:p>
+            <a:r>
+              <a:rPr lang="en-US" dirty="0" smtClean="0"/>
+              <a:t>2 main groups:</a:t>
+            </a:r>
+          </a:p>
+          <a:p>
+            <a:pPr lvl="1"/>
+            <a:r>
+              <a:rPr lang="en-US" dirty="0" smtClean="0"/>
+              <a:t>Classification: output is a category (“red”, “denied”, “infected”, etc.)</a:t>
+            </a:r>
+          </a:p>
+          <a:p>
+            <a:pPr lvl="1"/>
+            <a:r>
+              <a:rPr lang="en-US" dirty="0" smtClean="0"/>
+              <a:t>Regression: output is a real value ($, weights, </a:t>
+            </a:r>
+            <a:r>
+              <a:rPr lang="en-US" dirty="0" smtClean="0"/>
+              <a:t>etc.)</a:t>
+            </a:r>
+            <a:endParaRPr lang="en-US" dirty="0" smtClean="0"/>
+          </a:p>
+          <a:p>
+            <a:r>
+              <a:rPr lang="en-US" dirty="0" smtClean="0"/>
+              <a:t>Example: object recognition</a:t>
+            </a:r>
+          </a:p>
+        </p:txBody>
+      </p:sp>
+    </p:spTree>
+    <p:extLst>
+      <p:ext uri="{BB962C8B-B14F-4D97-AF65-F5344CB8AC3E}">
+        <p14:creationId xmlns:p14="http://schemas.microsoft.com/office/powerpoint/2010/main" val="3177986714"/>
+      </p:ext>
+    </p:extLst>
+  </p:cSld>
+  <p:clrMapOvr>
+    <a:masterClrMapping/>
+  </p:clrMapOvr>
+</p:sld>
+</file>
+
+<file path=ppt/slides/slide11.xml><?xml version="1.0" encoding="utf-8"?>
+<p:sld xmlns:a="http://schemas.openxmlformats.org/drawingml/2006/main" xmlns:r="http://schemas.openxmlformats.org/officeDocument/2006/relationships" xmlns:p="http://schemas.openxmlformats.org/presentationml/2006/main">
+  <p:cSld>
+    <p:spTree>
+      <p:nvGrpSpPr>
+        <p:cNvPr id="1" name=""/>
+        <p:cNvGrpSpPr/>
+        <p:nvPr/>
+      </p:nvGrpSpPr>
+      <p:grpSpPr>
+        <a:xfrm>
+          <a:off x="0" y="0"/>
+          <a:ext cx="0" cy="0"/>
+          <a:chOff x="0" y="0"/>
+          <a:chExt cx="0" cy="0"/>
+        </a:xfrm>
+      </p:grpSpPr>
+      <p:sp>
+        <p:nvSpPr>
+          <p:cNvPr id="2" name="Title 1"/>
+          <p:cNvSpPr>
+            <a:spLocks noGrp="1"/>
+          </p:cNvSpPr>
+          <p:nvPr>
+            <p:ph type="title"/>
+          </p:nvPr>
+        </p:nvSpPr>
+        <p:spPr/>
+        <p:txBody>
+          <a:bodyPr/>
+          <a:lstStyle/>
+          <a:p>
+            <a:r>
+              <a:rPr lang="en-US" dirty="0" smtClean="0"/>
+              <a:t>Unsupervised methods</a:t>
+            </a:r>
+            <a:endParaRPr lang="en-US" dirty="0"/>
+          </a:p>
+        </p:txBody>
+      </p:sp>
+      <p:sp>
+        <p:nvSpPr>
+          <p:cNvPr id="3" name="Content Placeholder 2"/>
+          <p:cNvSpPr>
+            <a:spLocks noGrp="1"/>
+          </p:cNvSpPr>
+          <p:nvPr>
+            <p:ph idx="1"/>
+          </p:nvPr>
+        </p:nvSpPr>
+        <p:spPr/>
+        <p:txBody>
+          <a:bodyPr/>
+          <a:lstStyle/>
+          <a:p>
+            <a:r>
+              <a:rPr lang="en-US" dirty="0" smtClean="0"/>
+              <a:t>Every </a:t>
+            </a:r>
+            <a:r>
+              <a:rPr lang="en-US" dirty="0"/>
+              <a:t>input </a:t>
+            </a:r>
+            <a:r>
+              <a:rPr lang="en-US" dirty="0" smtClean="0"/>
+              <a:t>is independent and has no </a:t>
+            </a:r>
+            <a:r>
+              <a:rPr lang="en-US" dirty="0"/>
+              <a:t>associated label: </a:t>
+            </a:r>
+            <a:r>
+              <a:rPr lang="en-US" dirty="0" smtClean="0"/>
+              <a:t>f(X) = ???</a:t>
+            </a:r>
+            <a:endParaRPr lang="en-US" dirty="0"/>
+          </a:p>
+          <a:p>
+            <a:r>
+              <a:rPr lang="en-US" dirty="0"/>
+              <a:t>2 main groups:</a:t>
+            </a:r>
+          </a:p>
+          <a:p>
+            <a:pPr lvl="1"/>
+            <a:r>
+              <a:rPr lang="en-US" dirty="0" smtClean="0"/>
+              <a:t>Clustering: want to discover the inherent groupings in data (ex: group customers by purchasing behavior)</a:t>
+            </a:r>
+            <a:endParaRPr lang="en-US" dirty="0"/>
+          </a:p>
+          <a:p>
+            <a:pPr lvl="1"/>
+            <a:r>
+              <a:rPr lang="en-US" dirty="0" smtClean="0"/>
+              <a:t>Association: want to discover rules that describe large portions of data (ex: people that buy A also tend to buy B)</a:t>
+            </a:r>
+            <a:endParaRPr lang="en-US" dirty="0"/>
+          </a:p>
+          <a:p>
+            <a:r>
+              <a:rPr lang="en-US" dirty="0" smtClean="0"/>
+              <a:t>Example: image processing</a:t>
+            </a:r>
+            <a:endParaRPr lang="en-US" dirty="0"/>
+          </a:p>
+        </p:txBody>
+      </p:sp>
+    </p:spTree>
+    <p:extLst>
+      <p:ext uri="{BB962C8B-B14F-4D97-AF65-F5344CB8AC3E}">
+        <p14:creationId xmlns:p14="http://schemas.microsoft.com/office/powerpoint/2010/main" val="644488735"/>
+      </p:ext>
+    </p:extLst>
+  </p:cSld>
+  <p:clrMapOvr>
+    <a:masterClrMapping/>
+  </p:clrMapOvr>
+</p:sld>
+</file>
+
+<file path=ppt/slides/slide12.xml><?xml version="1.0" encoding="utf-8"?>
+<p:sld xmlns:a="http://schemas.openxmlformats.org/drawingml/2006/main" xmlns:r="http://schemas.openxmlformats.org/officeDocument/2006/relationships" xmlns:p="http://schemas.openxmlformats.org/presentationml/2006/main">
+  <p:cSld>
+    <p:spTree>
+      <p:nvGrpSpPr>
+        <p:cNvPr id="1" name=""/>
+        <p:cNvGrpSpPr/>
+        <p:nvPr/>
+      </p:nvGrpSpPr>
+      <p:grpSpPr>
+        <a:xfrm>
+          <a:off x="0" y="0"/>
+          <a:ext cx="0" cy="0"/>
+          <a:chOff x="0" y="0"/>
+          <a:chExt cx="0" cy="0"/>
+        </a:xfrm>
+      </p:grpSpPr>
+      <p:sp>
+        <p:nvSpPr>
+          <p:cNvPr id="2" name="Title 1"/>
+          <p:cNvSpPr>
+            <a:spLocks noGrp="1"/>
+          </p:cNvSpPr>
+          <p:nvPr>
+            <p:ph type="title"/>
+          </p:nvPr>
+        </p:nvSpPr>
+        <p:spPr/>
+        <p:txBody>
+          <a:bodyPr/>
+          <a:lstStyle/>
+          <a:p>
+            <a:r>
+              <a:rPr lang="en-US" dirty="0" smtClean="0"/>
+              <a:t>Reinforcement Methods</a:t>
+            </a:r>
+            <a:endParaRPr lang="en-US" dirty="0"/>
+          </a:p>
+        </p:txBody>
+      </p:sp>
+      <p:sp>
+        <p:nvSpPr>
+          <p:cNvPr id="3" name="Content Placeholder 2"/>
+          <p:cNvSpPr>
+            <a:spLocks noGrp="1"/>
+          </p:cNvSpPr>
+          <p:nvPr>
+            <p:ph idx="1"/>
+          </p:nvPr>
+        </p:nvSpPr>
+        <p:spPr/>
+        <p:txBody>
+          <a:bodyPr/>
+          <a:lstStyle/>
+          <a:p>
+            <a:r>
+              <a:rPr lang="en-US" dirty="0"/>
+              <a:t>Every input </a:t>
+            </a:r>
+            <a:r>
+              <a:rPr lang="en-US" dirty="0" smtClean="0"/>
+              <a:t>is dependent on the previous input and decision</a:t>
+            </a:r>
+            <a:endParaRPr lang="en-US" dirty="0"/>
+          </a:p>
+          <a:p>
+            <a:r>
+              <a:rPr lang="en-US" dirty="0"/>
+              <a:t>2 main groups:</a:t>
+            </a:r>
+          </a:p>
+          <a:p>
+            <a:pPr lvl="1"/>
+            <a:r>
+              <a:rPr lang="en-US" dirty="0" smtClean="0"/>
+              <a:t>Positive: an event happens due to a particular behavior which then increases the strength and the frequency of the behavior</a:t>
+            </a:r>
+            <a:endParaRPr lang="en-US" dirty="0"/>
+          </a:p>
+          <a:p>
+            <a:pPr lvl="1"/>
+            <a:r>
+              <a:rPr lang="en-US" dirty="0" smtClean="0"/>
+              <a:t>Negative: strengthening of a behavior because a negative condition is stopped or avoided</a:t>
+            </a:r>
+          </a:p>
+          <a:p>
+            <a:r>
+              <a:rPr lang="en-US" dirty="0" smtClean="0"/>
+              <a:t>Example: Chess</a:t>
+            </a:r>
+            <a:endParaRPr lang="en-US" dirty="0"/>
+          </a:p>
+        </p:txBody>
+      </p:sp>
+    </p:spTree>
+    <p:extLst>
+      <p:ext uri="{BB962C8B-B14F-4D97-AF65-F5344CB8AC3E}">
+        <p14:creationId xmlns:p14="http://schemas.microsoft.com/office/powerpoint/2010/main" val="4043047913"/>
+      </p:ext>
+    </p:extLst>
+  </p:cSld>
+  <p:clrMapOvr>
+    <a:masterClrMapping/>
+  </p:clrMapOvr>
+</p:sld>
+</file>
+
+<file path=ppt/slides/slide13.xml><?xml version="1.0" encoding="utf-8"?>
+<p:sld xmlns:a="http://schemas.openxmlformats.org/drawingml/2006/main" xmlns:r="http://schemas.openxmlformats.org/officeDocument/2006/relationships" xmlns:p="http://schemas.openxmlformats.org/presentationml/2006/main">
+  <p:cSld>
+    <p:spTree>
+      <p:nvGrpSpPr>
+        <p:cNvPr id="1" name=""/>
+        <p:cNvGrpSpPr/>
+        <p:nvPr/>
+      </p:nvGrpSpPr>
+      <p:grpSpPr>
+        <a:xfrm>
+          <a:off x="0" y="0"/>
+          <a:ext cx="0" cy="0"/>
+          <a:chOff x="0" y="0"/>
+          <a:chExt cx="0" cy="0"/>
+        </a:xfrm>
+      </p:grpSpPr>
+      <p:sp>
+        <p:nvSpPr>
+          <p:cNvPr id="2" name="Title 1"/>
+          <p:cNvSpPr>
+            <a:spLocks noGrp="1"/>
+          </p:cNvSpPr>
+          <p:nvPr>
+            <p:ph type="title"/>
+          </p:nvPr>
+        </p:nvSpPr>
         <p:spPr>
           <a:xfrm>
             <a:off x="1307668" y="0"/>
@@ -12663,7 +13006,7 @@
 </p:sld>
 </file>
 
-<file path=ppt/slides/slide11.xml><?xml version="1.0" encoding="utf-8"?>
+<file path=ppt/slides/slide14.xml><?xml version="1.0" encoding="utf-8"?>
 <p:sld xmlns:a="http://schemas.openxmlformats.org/drawingml/2006/main" xmlns:r="http://schemas.openxmlformats.org/officeDocument/2006/relationships" xmlns:p="http://schemas.openxmlformats.org/presentationml/2006/main">
   <p:cSld>
     <p:spTree>
@@ -12909,7 +13252,7 @@
           <a:p>
             <a:r>
               <a:rPr lang="en-US" dirty="0" smtClean="0"/>
-              <a:t>When not to use machine learning</a:t>
+              <a:t>Cool Examples of Machine Learning</a:t>
             </a:r>
             <a:endParaRPr lang="en-US" dirty="0"/>
           </a:p>
@@ -12932,37 +13275,26 @@
           <a:p>
             <a:r>
               <a:rPr lang="en-US" dirty="0" smtClean="0"/>
-              <a:t>Not enough data</a:t>
+              <a:t>Amazon Echo and Google Home</a:t>
             </a:r>
           </a:p>
           <a:p>
             <a:r>
               <a:rPr lang="en-US" dirty="0" smtClean="0"/>
-              <a:t>Not enough time/resources</a:t>
+              <a:t>Email spam and Malware</a:t>
             </a:r>
           </a:p>
           <a:p>
             <a:r>
               <a:rPr lang="en-US" dirty="0" smtClean="0"/>
-              <a:t>Problem is not complex enough to need ML</a:t>
+              <a:t>Medical Diagnoses</a:t>
             </a:r>
           </a:p>
           <a:p>
             <a:r>
               <a:rPr lang="en-US" dirty="0" smtClean="0"/>
-              <a:t>You know the rules</a:t>
-            </a:r>
-          </a:p>
-          <a:p>
-            <a:r>
-              <a:rPr lang="en-US" dirty="0" smtClean="0"/>
-              <a:t>Low error tolerance </a:t>
-            </a:r>
-          </a:p>
-          <a:p>
-            <a:endParaRPr lang="en-US" dirty="0" smtClean="0"/>
-          </a:p>
-          <a:p>
+              <a:t>Recommendation engines</a:t>
+            </a:r>
             <a:endParaRPr lang="en-US" dirty="0"/>
           </a:p>
         </p:txBody>
@@ -12970,7 +13302,7 @@
     </p:spTree>
     <p:extLst>
       <p:ext uri="{BB962C8B-B14F-4D97-AF65-F5344CB8AC3E}">
-        <p14:creationId xmlns:p14="http://schemas.microsoft.com/office/powerpoint/2010/main" val="2042955393"/>
+        <p14:creationId xmlns:p14="http://schemas.microsoft.com/office/powerpoint/2010/main" val="3635113721"/>
       </p:ext>
     </p:extLst>
   </p:cSld>
@@ -12997,79 +13329,34 @@
           <a:chExt cx="0" cy="0"/>
         </a:xfrm>
       </p:grpSpPr>
-      <p:sp>
-        <p:nvSpPr>
-          <p:cNvPr id="2" name="Title 1"/>
-          <p:cNvSpPr>
-            <a:spLocks noGrp="1"/>
-          </p:cNvSpPr>
-          <p:nvPr>
-            <p:ph type="title"/>
-          </p:nvPr>
-        </p:nvSpPr>
-        <p:spPr/>
-        <p:txBody>
-          <a:bodyPr/>
-          <a:lstStyle/>
-          <a:p>
-            <a:r>
-              <a:rPr lang="en-US" dirty="0" smtClean="0"/>
-              <a:t>Why use machine learning</a:t>
-            </a:r>
-            <a:endParaRPr lang="en-US" dirty="0"/>
-          </a:p>
-        </p:txBody>
-      </p:sp>
-      <p:sp>
-        <p:nvSpPr>
-          <p:cNvPr id="3" name="Content Placeholder 2"/>
-          <p:cNvSpPr>
-            <a:spLocks noGrp="1"/>
-          </p:cNvSpPr>
-          <p:nvPr>
-            <p:ph idx="1"/>
-          </p:nvPr>
-        </p:nvSpPr>
-        <p:spPr/>
-        <p:txBody>
-          <a:bodyPr/>
-          <a:lstStyle/>
-          <a:p>
-            <a:r>
-              <a:rPr lang="en-US" dirty="0" smtClean="0"/>
-              <a:t>Saves time and money</a:t>
-            </a:r>
-          </a:p>
-          <a:p>
-            <a:r>
-              <a:rPr lang="en-US" dirty="0" smtClean="0"/>
-              <a:t>Removes the human aspect</a:t>
-            </a:r>
-          </a:p>
-          <a:p>
-            <a:r>
-              <a:rPr lang="en-US" dirty="0" smtClean="0"/>
-              <a:t>Easily identifies trends/patterns</a:t>
-            </a:r>
-          </a:p>
-          <a:p>
-            <a:r>
-              <a:rPr lang="en-US" dirty="0" smtClean="0"/>
-              <a:t>Improves over time</a:t>
-            </a:r>
-          </a:p>
-          <a:p>
-            <a:r>
-              <a:rPr lang="en-US" dirty="0" smtClean="0"/>
-              <a:t>Automation</a:t>
-            </a:r>
-          </a:p>
-        </p:txBody>
-      </p:sp>
+      <p:pic>
+        <p:nvPicPr>
+          <p:cNvPr id="2" name="Picture 1"/>
+          <p:cNvPicPr>
+            <a:picLocks noChangeAspect="1"/>
+          </p:cNvPicPr>
+          <p:nvPr/>
+        </p:nvPicPr>
+        <p:blipFill>
+          <a:blip r:embed="rId2"/>
+          <a:stretch>
+            <a:fillRect/>
+          </a:stretch>
+        </p:blipFill>
+        <p:spPr>
+          <a:xfrm>
+            <a:off x="1864200" y="490903"/>
+            <a:ext cx="7832252" cy="5619751"/>
+          </a:xfrm>
+          <a:prstGeom prst="rect">
+            <a:avLst/>
+          </a:prstGeom>
+        </p:spPr>
+      </p:pic>
     </p:spTree>
     <p:extLst>
       <p:ext uri="{BB962C8B-B14F-4D97-AF65-F5344CB8AC3E}">
-        <p14:creationId xmlns:p14="http://schemas.microsoft.com/office/powerpoint/2010/main" val="3516988631"/>
+        <p14:creationId xmlns:p14="http://schemas.microsoft.com/office/powerpoint/2010/main" val="2098943848"/>
       </p:ext>
     </p:extLst>
   </p:cSld>
@@ -13113,7 +13400,7 @@
           <a:p>
             <a:r>
               <a:rPr lang="en-US" dirty="0" smtClean="0"/>
-              <a:t>Machine learning terminology</a:t>
+              <a:t>Why use machine learning</a:t>
             </a:r>
             <a:endParaRPr lang="en-US" dirty="0"/>
           </a:p>
@@ -13129,68 +13416,46 @@
             <p:ph idx="1"/>
           </p:nvPr>
         </p:nvSpPr>
-        <p:spPr>
-          <a:xfrm>
-            <a:off x="1141412" y="2432367"/>
-            <a:ext cx="9905999" cy="3541714"/>
-          </a:xfrm>
-        </p:spPr>
+        <p:spPr/>
         <p:txBody>
           <a:bodyPr/>
           <a:lstStyle/>
           <a:p>
             <a:r>
               <a:rPr lang="en-US" dirty="0" smtClean="0"/>
-              <a:t>Training data: data used to teach the model</a:t>
+              <a:t>Saves time and money</a:t>
             </a:r>
           </a:p>
           <a:p>
             <a:r>
               <a:rPr lang="en-US" dirty="0" smtClean="0"/>
-              <a:t>Test data: data used to test the model</a:t>
+              <a:t>Removes the human aspect</a:t>
             </a:r>
           </a:p>
           <a:p>
             <a:r>
               <a:rPr lang="en-US" dirty="0" smtClean="0"/>
-              <a:t>Features: attributes that a model uses to predict an outcome</a:t>
+              <a:t>Easily identifies trends/patterns</a:t>
             </a:r>
           </a:p>
           <a:p>
             <a:r>
               <a:rPr lang="en-US" dirty="0" smtClean="0"/>
-              <a:t>Label: the answer for a prediction (supervised)</a:t>
+              <a:t>Improves over time</a:t>
             </a:r>
           </a:p>
           <a:p>
             <a:r>
               <a:rPr lang="en-US" dirty="0" smtClean="0"/>
-              <a:t>Model/Classifier: an </a:t>
-            </a:r>
-            <a:r>
-              <a:rPr lang="en-US" dirty="0"/>
-              <a:t>mathematical </a:t>
-            </a:r>
-            <a:r>
-              <a:rPr lang="en-US" dirty="0" smtClean="0"/>
-              <a:t>algorithm that “learns” from training data</a:t>
-            </a:r>
-          </a:p>
-          <a:p>
-            <a:r>
-              <a:rPr lang="en-US" dirty="0" smtClean="0"/>
-              <a:t>Metrics: measures to explain the performance of the model</a:t>
-            </a:r>
-          </a:p>
-          <a:p>
-            <a:endParaRPr lang="en-US" dirty="0"/>
+              <a:t>Automation</a:t>
+            </a:r>
           </a:p>
         </p:txBody>
       </p:sp>
     </p:spTree>
     <p:extLst>
       <p:ext uri="{BB962C8B-B14F-4D97-AF65-F5344CB8AC3E}">
-        <p14:creationId xmlns:p14="http://schemas.microsoft.com/office/powerpoint/2010/main" val="1451626524"/>
+        <p14:creationId xmlns:p14="http://schemas.microsoft.com/office/powerpoint/2010/main" val="3516988631"/>
       </p:ext>
     </p:extLst>
   </p:cSld>
@@ -13227,21 +13492,14 @@
             <p:ph type="title"/>
           </p:nvPr>
         </p:nvSpPr>
-        <p:spPr>
-          <a:xfrm>
-            <a:off x="1141413" y="618518"/>
-            <a:ext cx="9905998" cy="570202"/>
-          </a:xfrm>
-        </p:spPr>
+        <p:spPr/>
         <p:txBody>
-          <a:bodyPr>
-            <a:normAutofit fontScale="90000"/>
-          </a:bodyPr>
+          <a:bodyPr/>
           <a:lstStyle/>
           <a:p>
             <a:r>
               <a:rPr lang="en-US" dirty="0" smtClean="0"/>
-              <a:t>How Does the Process Work?</a:t>
+              <a:t>When not to use machine learning</a:t>
             </a:r>
             <a:endParaRPr lang="en-US" dirty="0"/>
           </a:p>
@@ -13257,139 +13515,52 @@
             <p:ph idx="1"/>
           </p:nvPr>
         </p:nvSpPr>
-        <p:spPr>
-          <a:xfrm>
-            <a:off x="1141412" y="1571106"/>
-            <a:ext cx="9905999" cy="4544292"/>
-          </a:xfrm>
-        </p:spPr>
+        <p:spPr/>
         <p:txBody>
-          <a:bodyPr>
-            <a:normAutofit fontScale="92500" lnSpcReduction="20000"/>
-          </a:bodyPr>
+          <a:bodyPr/>
           <a:lstStyle/>
           <a:p>
             <a:r>
               <a:rPr lang="en-US" dirty="0" smtClean="0"/>
-              <a:t>Understand the data</a:t>
-            </a:r>
-          </a:p>
-          <a:p>
-            <a:pPr lvl="1"/>
+              <a:t>Not enough data</a:t>
+            </a:r>
+          </a:p>
+          <a:p>
             <a:r>
               <a:rPr lang="en-US" dirty="0" smtClean="0"/>
-              <a:t>Know it</a:t>
-            </a:r>
-          </a:p>
-          <a:p>
-            <a:pPr lvl="1"/>
+              <a:t>Not enough time/resources</a:t>
+            </a:r>
+          </a:p>
+          <a:p>
             <a:r>
               <a:rPr lang="en-US" dirty="0" smtClean="0"/>
-              <a:t>Clean it</a:t>
-            </a:r>
-          </a:p>
-          <a:p>
-            <a:pPr lvl="1"/>
+              <a:t>Problem is not complex enough to need ML</a:t>
+            </a:r>
+          </a:p>
+          <a:p>
             <a:r>
               <a:rPr lang="en-US" dirty="0" smtClean="0"/>
-              <a:t>Augment it</a:t>
+              <a:t>You know the rules</a:t>
             </a:r>
           </a:p>
           <a:p>
             <a:r>
               <a:rPr lang="en-US" dirty="0" smtClean="0"/>
-              <a:t>Categorize the problem</a:t>
-            </a:r>
-          </a:p>
-          <a:p>
-            <a:pPr lvl="1"/>
-            <a:r>
-              <a:rPr lang="en-US" dirty="0" smtClean="0"/>
-              <a:t>Supervised</a:t>
-            </a:r>
-          </a:p>
-          <a:p>
-            <a:pPr lvl="1"/>
-            <a:r>
-              <a:rPr lang="en-US" dirty="0" smtClean="0"/>
-              <a:t>Unsupervised</a:t>
-            </a:r>
-          </a:p>
-          <a:p>
-            <a:r>
-              <a:rPr lang="en-US" dirty="0" smtClean="0"/>
-              <a:t>Understand the constraints</a:t>
-            </a:r>
-          </a:p>
-          <a:p>
-            <a:pPr lvl="1"/>
-            <a:r>
-              <a:rPr lang="en-US" dirty="0" smtClean="0"/>
-              <a:t>Size</a:t>
-            </a:r>
-          </a:p>
-          <a:p>
-            <a:pPr lvl="1"/>
-            <a:r>
-              <a:rPr lang="en-US" dirty="0"/>
-              <a:t>T</a:t>
-            </a:r>
-            <a:r>
-              <a:rPr lang="en-US" dirty="0" smtClean="0"/>
-              <a:t>ime</a:t>
-            </a:r>
-          </a:p>
-          <a:p>
-            <a:r>
-              <a:rPr lang="en-US" dirty="0" smtClean="0"/>
-              <a:t>Find an algorithm(s)</a:t>
-            </a:r>
+              <a:t>Low error tolerance </a:t>
+            </a:r>
+          </a:p>
+          <a:p>
+            <a:endParaRPr lang="en-US" dirty="0" smtClean="0"/>
+          </a:p>
+          <a:p>
             <a:endParaRPr lang="en-US" dirty="0"/>
-          </a:p>
-          <a:p>
-            <a:pPr marL="457200" lvl="1" indent="0">
-              <a:buNone/>
-            </a:pPr>
-            <a:endParaRPr lang="en-US" dirty="0"/>
-          </a:p>
-        </p:txBody>
-      </p:sp>
-      <p:sp>
-        <p:nvSpPr>
-          <p:cNvPr id="4" name="TextBox 3"/>
-          <p:cNvSpPr txBox="1"/>
-          <p:nvPr/>
-        </p:nvSpPr>
-        <p:spPr>
-          <a:xfrm>
-            <a:off x="1221971" y="6359284"/>
-            <a:ext cx="5534720" cy="276999"/>
-          </a:xfrm>
-          <a:prstGeom prst="rect">
-            <a:avLst/>
-          </a:prstGeom>
-          <a:noFill/>
-        </p:spPr>
-        <p:txBody>
-          <a:bodyPr wrap="none" rtlCol="0">
-            <a:spAutoFit/>
-          </a:bodyPr>
-          <a:lstStyle/>
-          <a:p>
-            <a:r>
-              <a:rPr lang="en-US" sz="1200" dirty="0">
-                <a:hlinkClick r:id="rId2"/>
-              </a:rPr>
-              <a:t>https://hackernoon.com/choosing-the-right-machine-learning-algorithm-68126944ce1f</a:t>
-            </a:r>
-            <a:endParaRPr lang="en-US" sz="1200" dirty="0"/>
           </a:p>
         </p:txBody>
       </p:sp>
     </p:spTree>
     <p:extLst>
       <p:ext uri="{BB962C8B-B14F-4D97-AF65-F5344CB8AC3E}">
-        <p14:creationId xmlns:p14="http://schemas.microsoft.com/office/powerpoint/2010/main" val="133950412"/>
+        <p14:creationId xmlns:p14="http://schemas.microsoft.com/office/powerpoint/2010/main" val="2042955393"/>
       </p:ext>
     </p:extLst>
   </p:cSld>
@@ -13433,7 +13604,7 @@
           <a:p>
             <a:r>
               <a:rPr lang="en-US" dirty="0" smtClean="0"/>
-              <a:t>Supervised vs unsupervised</a:t>
+              <a:t>Machine learning terminology</a:t>
             </a:r>
             <a:endParaRPr lang="en-US" dirty="0"/>
           </a:p>
@@ -13449,50 +13620,76 @@
             <p:ph idx="1"/>
           </p:nvPr>
         </p:nvSpPr>
-        <p:spPr/>
+        <p:spPr>
+          <a:xfrm>
+            <a:off x="1141412" y="2432367"/>
+            <a:ext cx="9905999" cy="3541714"/>
+          </a:xfrm>
+        </p:spPr>
         <p:txBody>
           <a:bodyPr/>
           <a:lstStyle/>
           <a:p>
-            <a:endParaRPr lang="en-US" dirty="0" smtClean="0"/>
+            <a:r>
+              <a:rPr lang="en-US" dirty="0"/>
+              <a:t>Features: attributes that a model uses to predict an outcome</a:t>
+            </a:r>
+          </a:p>
+          <a:p>
+            <a:r>
+              <a:rPr lang="en-US" dirty="0"/>
+              <a:t>Label: the field we are trying to prediction (supervised)</a:t>
+            </a:r>
           </a:p>
           <a:p>
             <a:r>
               <a:rPr lang="en-US" dirty="0" smtClean="0"/>
-              <a:t>Depends on data</a:t>
-            </a:r>
-          </a:p>
-          <a:p>
-            <a:pPr lvl="1"/>
+              <a:t>Training </a:t>
+            </a:r>
             <a:r>
               <a:rPr lang="en-US" dirty="0" smtClean="0"/>
-              <a:t>Type of input</a:t>
-            </a:r>
-          </a:p>
-          <a:p>
-            <a:pPr lvl="1"/>
+              <a:t>data: data used to teach the model</a:t>
+            </a:r>
+          </a:p>
+          <a:p>
             <a:r>
               <a:rPr lang="en-US" dirty="0" smtClean="0"/>
-              <a:t>Labels?</a:t>
-            </a:r>
-          </a:p>
-          <a:p>
-            <a:pPr lvl="1"/>
+              <a:t>Test data: data used to test the model</a:t>
+            </a:r>
+          </a:p>
+          <a:p>
             <a:r>
               <a:rPr lang="en-US" dirty="0" smtClean="0"/>
-              <a:t>Type of Outcome</a:t>
-            </a:r>
-          </a:p>
-          <a:p>
-            <a:pPr lvl="1"/>
-            <a:endParaRPr lang="en-US" dirty="0" smtClean="0"/>
+              <a:t>Model</a:t>
+            </a:r>
+            <a:r>
+              <a:rPr lang="en-US" dirty="0" smtClean="0"/>
+              <a:t>: a </a:t>
+            </a:r>
+            <a:r>
+              <a:rPr lang="en-US" dirty="0"/>
+              <a:t>mathematical </a:t>
+            </a:r>
+            <a:r>
+              <a:rPr lang="en-US" dirty="0" smtClean="0"/>
+              <a:t>algorithm that “learns” from training data</a:t>
+            </a:r>
+          </a:p>
+          <a:p>
+            <a:r>
+              <a:rPr lang="en-US" dirty="0" smtClean="0"/>
+              <a:t>Metrics: measures to explain the performance of the model</a:t>
+            </a:r>
+          </a:p>
+          <a:p>
+            <a:endParaRPr lang="en-US" dirty="0"/>
           </a:p>
         </p:txBody>
       </p:sp>
     </p:spTree>
     <p:extLst>
       <p:ext uri="{BB962C8B-B14F-4D97-AF65-F5344CB8AC3E}">
-        <p14:creationId xmlns:p14="http://schemas.microsoft.com/office/powerpoint/2010/main" val="167440575"/>
+        <p14:creationId xmlns:p14="http://schemas.microsoft.com/office/powerpoint/2010/main" val="1451626524"/>
       </p:ext>
     </p:extLst>
   </p:cSld>
@@ -13529,14 +13726,21 @@
             <p:ph type="title"/>
           </p:nvPr>
         </p:nvSpPr>
-        <p:spPr/>
+        <p:spPr>
+          <a:xfrm>
+            <a:off x="1141413" y="618518"/>
+            <a:ext cx="9905998" cy="570202"/>
+          </a:xfrm>
+        </p:spPr>
         <p:txBody>
-          <a:bodyPr/>
+          <a:bodyPr>
+            <a:normAutofit fontScale="90000"/>
+          </a:bodyPr>
           <a:lstStyle/>
           <a:p>
             <a:r>
               <a:rPr lang="en-US" dirty="0" smtClean="0"/>
-              <a:t>Supervised methods</a:t>
+              <a:t>How Does the Process Work?</a:t>
             </a:r>
             <a:endParaRPr lang="en-US" dirty="0"/>
           </a:p>
@@ -13552,53 +13756,151 @@
             <p:ph idx="1"/>
           </p:nvPr>
         </p:nvSpPr>
-        <p:spPr/>
+        <p:spPr>
+          <a:xfrm>
+            <a:off x="1141412" y="1571106"/>
+            <a:ext cx="9905999" cy="4544292"/>
+          </a:xfrm>
+        </p:spPr>
         <p:txBody>
-          <a:bodyPr/>
+          <a:bodyPr>
+            <a:normAutofit fontScale="85000" lnSpcReduction="20000"/>
+          </a:bodyPr>
           <a:lstStyle/>
           <a:p>
             <a:r>
               <a:rPr lang="en-US" dirty="0" smtClean="0"/>
-              <a:t>Every input has an associated label: f(x) = y</a:t>
-            </a:r>
-          </a:p>
-          <a:p>
+              <a:t>Understand the </a:t>
+            </a:r>
+            <a:r>
+              <a:rPr lang="en-US" dirty="0" smtClean="0"/>
+              <a:t>problem and the data</a:t>
+            </a:r>
             <a:endParaRPr lang="en-US" dirty="0" smtClean="0"/>
           </a:p>
           <a:p>
+            <a:pPr lvl="1"/>
             <a:r>
               <a:rPr lang="en-US" dirty="0" smtClean="0"/>
-              <a:t>2 main groups:</a:t>
+              <a:t>Know it</a:t>
             </a:r>
           </a:p>
           <a:p>
             <a:pPr lvl="1"/>
             <a:r>
               <a:rPr lang="en-US" dirty="0" smtClean="0"/>
-              <a:t>Classification: output is a category (“red”, “denied”, “infected”, etc.)</a:t>
+              <a:t>Clean it</a:t>
             </a:r>
           </a:p>
           <a:p>
             <a:pPr lvl="1"/>
             <a:r>
               <a:rPr lang="en-US" dirty="0" smtClean="0"/>
-              <a:t>Regression: output is a real value ($, weights, </a:t>
-            </a:r>
-            <a:r>
-              <a:rPr lang="en-US" dirty="0" err="1" smtClean="0"/>
-              <a:t>etc</a:t>
-            </a:r>
+              <a:t>Augment it</a:t>
+            </a:r>
+          </a:p>
+          <a:p>
             <a:r>
               <a:rPr lang="en-US" dirty="0" smtClean="0"/>
-              <a:t>)</a:t>
-            </a:r>
+              <a:t>Categorize the problem</a:t>
+            </a:r>
+          </a:p>
+          <a:p>
+            <a:pPr lvl="1"/>
+            <a:r>
+              <a:rPr lang="en-US" dirty="0" smtClean="0"/>
+              <a:t>Supervised</a:t>
+            </a:r>
+          </a:p>
+          <a:p>
+            <a:pPr lvl="1"/>
+            <a:r>
+              <a:rPr lang="en-US" dirty="0" smtClean="0"/>
+              <a:t>Unsupervised</a:t>
+            </a:r>
+          </a:p>
+          <a:p>
+            <a:pPr lvl="1"/>
+            <a:r>
+              <a:rPr lang="en-US" dirty="0" smtClean="0"/>
+              <a:t>Reinforcement</a:t>
+            </a:r>
+          </a:p>
+          <a:p>
+            <a:r>
+              <a:rPr lang="en-US" dirty="0" smtClean="0"/>
+              <a:t>Understand the constraints</a:t>
+            </a:r>
+          </a:p>
+          <a:p>
+            <a:pPr lvl="1"/>
+            <a:r>
+              <a:rPr lang="en-US" dirty="0" smtClean="0"/>
+              <a:t>Size</a:t>
+            </a:r>
+          </a:p>
+          <a:p>
+            <a:pPr lvl="1"/>
+            <a:r>
+              <a:rPr lang="en-US" dirty="0"/>
+              <a:t>T</a:t>
+            </a:r>
+            <a:r>
+              <a:rPr lang="en-US" dirty="0" smtClean="0"/>
+              <a:t>ime</a:t>
+            </a:r>
+          </a:p>
+          <a:p>
+            <a:r>
+              <a:rPr lang="en-US" dirty="0" smtClean="0"/>
+              <a:t>Find an algorithm(s)</a:t>
+            </a:r>
+            <a:endParaRPr lang="en-US" dirty="0"/>
+          </a:p>
+          <a:p>
+            <a:pPr marL="457200" lvl="1" indent="0">
+              <a:buNone/>
+            </a:pPr>
+            <a:endParaRPr lang="en-US" dirty="0"/>
+          </a:p>
+        </p:txBody>
+      </p:sp>
+      <p:sp>
+        <p:nvSpPr>
+          <p:cNvPr id="4" name="TextBox 3"/>
+          <p:cNvSpPr txBox="1"/>
+          <p:nvPr/>
+        </p:nvSpPr>
+        <p:spPr>
+          <a:xfrm>
+            <a:off x="1221971" y="6359284"/>
+            <a:ext cx="5534720" cy="276999"/>
+          </a:xfrm>
+          <a:prstGeom prst="rect">
+            <a:avLst/>
+          </a:prstGeom>
+          <a:noFill/>
+        </p:spPr>
+        <p:txBody>
+          <a:bodyPr wrap="none" rtlCol="0">
+            <a:spAutoFit/>
+          </a:bodyPr>
+          <a:lstStyle/>
+          <a:p>
+            <a:r>
+              <a:rPr lang="en-US" sz="1200" dirty="0">
+                <a:hlinkClick r:id="rId2"/>
+              </a:rPr>
+              <a:t>https://hackernoon.com/choosing-the-right-machine-learning-algorithm-68126944ce1f</a:t>
+            </a:r>
+            <a:endParaRPr lang="en-US" sz="1200" dirty="0"/>
           </a:p>
         </p:txBody>
       </p:sp>
     </p:spTree>
     <p:extLst>
       <p:ext uri="{BB962C8B-B14F-4D97-AF65-F5344CB8AC3E}">
-        <p14:creationId xmlns:p14="http://schemas.microsoft.com/office/powerpoint/2010/main" val="3177986714"/>
+        <p14:creationId xmlns:p14="http://schemas.microsoft.com/office/powerpoint/2010/main" val="133950412"/>
       </p:ext>
     </p:extLst>
   </p:cSld>
@@ -13642,7 +13944,23 @@
           <a:p>
             <a:r>
               <a:rPr lang="en-US" dirty="0" smtClean="0"/>
-              <a:t>Unsupervised methods</a:t>
+              <a:t>Supervised </a:t>
+            </a:r>
+            <a:r>
+              <a:rPr lang="en-US" sz="2000" dirty="0" smtClean="0"/>
+              <a:t>vs</a:t>
+            </a:r>
+            <a:r>
+              <a:rPr lang="en-US" dirty="0" smtClean="0"/>
+              <a:t> unsupervised </a:t>
+            </a:r>
+            <a:r>
+              <a:rPr lang="en-US" sz="2000" dirty="0" smtClean="0"/>
+              <a:t>vs</a:t>
+            </a:r>
+            <a:r>
+              <a:rPr lang="en-US" dirty="0" smtClean="0"/>
+              <a:t> Reinforcement</a:t>
             </a:r>
             <a:endParaRPr lang="en-US" dirty="0"/>
           </a:p>
@@ -13658,73 +13976,73 @@
             <p:ph idx="1"/>
           </p:nvPr>
         </p:nvSpPr>
-        <p:spPr/>
+        <p:spPr>
+          <a:xfrm>
+            <a:off x="1141412" y="2097088"/>
+            <a:ext cx="9905999" cy="3541714"/>
+          </a:xfrm>
+        </p:spPr>
         <p:txBody>
-          <a:bodyPr/>
+          <a:bodyPr>
+            <a:normAutofit fontScale="92500" lnSpcReduction="10000"/>
+          </a:bodyPr>
           <a:lstStyle/>
           <a:p>
+            <a:endParaRPr lang="en-US" dirty="0" smtClean="0"/>
+          </a:p>
+          <a:p>
             <a:r>
               <a:rPr lang="en-US" dirty="0" smtClean="0"/>
-              <a:t>Every </a:t>
-            </a:r>
-            <a:r>
-              <a:rPr lang="en-US" dirty="0"/>
-              <a:t>input has </a:t>
-            </a:r>
+              <a:t>Depends on the problem</a:t>
+            </a:r>
+          </a:p>
+          <a:p>
+            <a:pPr lvl="1"/>
             <a:r>
               <a:rPr lang="en-US" dirty="0" smtClean="0"/>
-              <a:t>no </a:t>
-            </a:r>
-            <a:r>
-              <a:rPr lang="en-US" dirty="0"/>
-              <a:t>associated label: </a:t>
-            </a:r>
+              <a:t>Dependent or Independent?</a:t>
+            </a:r>
+          </a:p>
+          <a:p>
+            <a:endParaRPr lang="en-US" dirty="0" smtClean="0"/>
+          </a:p>
+          <a:p>
             <a:r>
               <a:rPr lang="en-US" dirty="0" smtClean="0"/>
-              <a:t>f(X) = ???</a:t>
-            </a:r>
-            <a:endParaRPr lang="en-US" dirty="0"/>
-          </a:p>
-          <a:p>
-            <a:pPr marL="0" indent="0">
-              <a:buNone/>
-            </a:pPr>
-            <a:endParaRPr lang="en-US" dirty="0"/>
-          </a:p>
-          <a:p>
-            <a:r>
-              <a:rPr lang="en-US" dirty="0"/>
-              <a:t>2 main groups:</a:t>
+              <a:t>Depends on data</a:t>
             </a:r>
           </a:p>
           <a:p>
             <a:pPr lvl="1"/>
             <a:r>
               <a:rPr lang="en-US" dirty="0" smtClean="0"/>
-              <a:t>Clustering: want to discover the inherent groupings in data (ex: group customers by purchasing behavior)</a:t>
-            </a:r>
-            <a:endParaRPr lang="en-US" dirty="0"/>
+              <a:t>Type of input</a:t>
+            </a:r>
           </a:p>
           <a:p>
             <a:pPr lvl="1"/>
             <a:r>
               <a:rPr lang="en-US" dirty="0" smtClean="0"/>
-              <a:t>Association: want to discover rules that describe large portions of data (ex: people that buy A also tend to buy B)</a:t>
-            </a:r>
-            <a:endParaRPr lang="en-US" dirty="0"/>
-          </a:p>
-          <a:p>
-            <a:pPr marL="0" indent="0">
-              <a:buNone/>
-            </a:pPr>
-            <a:endParaRPr lang="en-US" dirty="0"/>
+              <a:t>Labels?</a:t>
+            </a:r>
+          </a:p>
+          <a:p>
+            <a:pPr lvl="1"/>
+            <a:r>
+              <a:rPr lang="en-US" dirty="0" smtClean="0"/>
+              <a:t>Type of Outcome</a:t>
+            </a:r>
+          </a:p>
+          <a:p>
+            <a:pPr lvl="1"/>
+            <a:endParaRPr lang="en-US" dirty="0" smtClean="0"/>
           </a:p>
         </p:txBody>
       </p:sp>
     </p:spTree>
     <p:extLst>
       <p:ext uri="{BB962C8B-B14F-4D97-AF65-F5344CB8AC3E}">
-        <p14:creationId xmlns:p14="http://schemas.microsoft.com/office/powerpoint/2010/main" val="644488735"/>
+        <p14:creationId xmlns:p14="http://schemas.microsoft.com/office/powerpoint/2010/main" val="167440575"/>
       </p:ext>
     </p:extLst>
   </p:cSld>

</xml_diff>